<commit_message>
Modify the position of some elements in the Meteorological influence/conditions sections
</commit_message>
<xml_diff>
--- a/sensortoolkit/evaluation_objs/templates/O3/Reporting_Template_Base_O3.pptx
+++ b/sensortoolkit/evaluation_objs/templates/O3/Reporting_Template_Base_O3.pptx
@@ -141,338 +141,6 @@
 
 <file path=ppt/changesInfos/changesInfo1.xml><?xml version="1.0" encoding="utf-8"?>
 <pc:chgInfo xmlns:a="http://schemas.openxmlformats.org/drawingml/2006/main" xmlns:r="http://schemas.openxmlformats.org/officeDocument/2006/relationships" xmlns:ac="http://schemas.microsoft.com/office/drawing/2013/main/command" xmlns:pc="http://schemas.microsoft.com/office/powerpoint/2013/main/command">
-  <pc:docChgLst>
-    <pc:chgData name="Frederick, Samuel" userId="090dec4f-7d84-4616-bef6-b2226d1b24c4" providerId="ADAL" clId="{360A67A5-37B6-4E00-A191-96F89693057C}"/>
-    <pc:docChg chg="undo redo custSel modSld modMainMaster">
-      <pc:chgData name="Frederick, Samuel" userId="090dec4f-7d84-4616-bef6-b2226d1b24c4" providerId="ADAL" clId="{360A67A5-37B6-4E00-A191-96F89693057C}" dt="2021-06-25T17:48:28.005" v="167" actId="478"/>
-      <pc:docMkLst>
-        <pc:docMk/>
-      </pc:docMkLst>
-      <pc:sldChg chg="addSp delSp modSp mod">
-        <pc:chgData name="Frederick, Samuel" userId="090dec4f-7d84-4616-bef6-b2226d1b24c4" providerId="ADAL" clId="{360A67A5-37B6-4E00-A191-96F89693057C}" dt="2021-06-25T17:48:28.005" v="167" actId="478"/>
-        <pc:sldMkLst>
-          <pc:docMk/>
-          <pc:sldMk cId="1609848839" sldId="256"/>
-        </pc:sldMkLst>
-        <pc:spChg chg="del">
-          <ac:chgData name="Frederick, Samuel" userId="090dec4f-7d84-4616-bef6-b2226d1b24c4" providerId="ADAL" clId="{360A67A5-37B6-4E00-A191-96F89693057C}" dt="2021-06-25T17:35:06.925" v="4"/>
-          <ac:spMkLst>
-            <pc:docMk/>
-            <pc:sldMk cId="1609848839" sldId="256"/>
-            <ac:spMk id="2" creationId="{D3BBE3C6-F1E4-4D42-8855-1B38098D718D}"/>
-          </ac:spMkLst>
-        </pc:spChg>
-        <pc:spChg chg="add mod">
-          <ac:chgData name="Frederick, Samuel" userId="090dec4f-7d84-4616-bef6-b2226d1b24c4" providerId="ADAL" clId="{360A67A5-37B6-4E00-A191-96F89693057C}" dt="2021-06-25T17:35:06.925" v="4"/>
-          <ac:spMkLst>
-            <pc:docMk/>
-            <pc:sldMk cId="1609848839" sldId="256"/>
-            <ac:spMk id="3" creationId="{E496A7F8-43F8-4BAA-ACE7-4F2FD405C445}"/>
-          </ac:spMkLst>
-        </pc:spChg>
-        <pc:spChg chg="del">
-          <ac:chgData name="Frederick, Samuel" userId="090dec4f-7d84-4616-bef6-b2226d1b24c4" providerId="ADAL" clId="{360A67A5-37B6-4E00-A191-96F89693057C}" dt="2021-06-25T17:35:06.925" v="4"/>
-          <ac:spMkLst>
-            <pc:docMk/>
-            <pc:sldMk cId="1609848839" sldId="256"/>
-            <ac:spMk id="4" creationId="{C1F6EC70-09A5-49CF-8C1A-8D0EB117AC03}"/>
-          </ac:spMkLst>
-        </pc:spChg>
-        <pc:spChg chg="del">
-          <ac:chgData name="Frederick, Samuel" userId="090dec4f-7d84-4616-bef6-b2226d1b24c4" providerId="ADAL" clId="{360A67A5-37B6-4E00-A191-96F89693057C}" dt="2021-06-25T17:35:06.925" v="4"/>
-          <ac:spMkLst>
-            <pc:docMk/>
-            <pc:sldMk cId="1609848839" sldId="256"/>
-            <ac:spMk id="5" creationId="{59B1715C-505C-471D-AC7B-8D5512F1F59D}"/>
-          </ac:spMkLst>
-        </pc:spChg>
-        <pc:spChg chg="add mod">
-          <ac:chgData name="Frederick, Samuel" userId="090dec4f-7d84-4616-bef6-b2226d1b24c4" providerId="ADAL" clId="{360A67A5-37B6-4E00-A191-96F89693057C}" dt="2021-06-25T17:35:06.925" v="4"/>
-          <ac:spMkLst>
-            <pc:docMk/>
-            <pc:sldMk cId="1609848839" sldId="256"/>
-            <ac:spMk id="6" creationId="{A96546AC-36CF-4A51-A082-C4DB57591699}"/>
-          </ac:spMkLst>
-        </pc:spChg>
-        <pc:spChg chg="add mod">
-          <ac:chgData name="Frederick, Samuel" userId="090dec4f-7d84-4616-bef6-b2226d1b24c4" providerId="ADAL" clId="{360A67A5-37B6-4E00-A191-96F89693057C}" dt="2021-06-25T17:35:06.925" v="4"/>
-          <ac:spMkLst>
-            <pc:docMk/>
-            <pc:sldMk cId="1609848839" sldId="256"/>
-            <ac:spMk id="7" creationId="{1F867A50-C366-451C-B510-1358A8E03B8F}"/>
-          </ac:spMkLst>
-        </pc:spChg>
-        <pc:spChg chg="del mod">
-          <ac:chgData name="Frederick, Samuel" userId="090dec4f-7d84-4616-bef6-b2226d1b24c4" providerId="ADAL" clId="{360A67A5-37B6-4E00-A191-96F89693057C}" dt="2021-06-25T17:44:02.034" v="115" actId="478"/>
-          <ac:spMkLst>
-            <pc:docMk/>
-            <pc:sldMk cId="1609848839" sldId="256"/>
-            <ac:spMk id="24" creationId="{E049956A-403C-4054-B4D6-AB0C98529660}"/>
-          </ac:spMkLst>
-        </pc:spChg>
-        <pc:spChg chg="mod">
-          <ac:chgData name="Frederick, Samuel" userId="090dec4f-7d84-4616-bef6-b2226d1b24c4" providerId="ADAL" clId="{360A67A5-37B6-4E00-A191-96F89693057C}" dt="2021-06-25T17:45:51.105" v="143" actId="1076"/>
-          <ac:spMkLst>
-            <pc:docMk/>
-            <pc:sldMk cId="1609848839" sldId="256"/>
-            <ac:spMk id="31" creationId="{C2D3D90C-F994-4CC3-8652-BCA3D4370ADC}"/>
-          </ac:spMkLst>
-        </pc:spChg>
-        <pc:spChg chg="add mod">
-          <ac:chgData name="Frederick, Samuel" userId="090dec4f-7d84-4616-bef6-b2226d1b24c4" providerId="ADAL" clId="{360A67A5-37B6-4E00-A191-96F89693057C}" dt="2021-06-25T17:48:21.649" v="166" actId="1076"/>
-          <ac:spMkLst>
-            <pc:docMk/>
-            <pc:sldMk cId="1609848839" sldId="256"/>
-            <ac:spMk id="34" creationId="{7D655D40-6DF2-4B90-8D9E-8C2B333DA162}"/>
-          </ac:spMkLst>
-        </pc:spChg>
-        <pc:spChg chg="mod">
-          <ac:chgData name="Frederick, Samuel" userId="090dec4f-7d84-4616-bef6-b2226d1b24c4" providerId="ADAL" clId="{360A67A5-37B6-4E00-A191-96F89693057C}" dt="2021-06-25T17:46:59.305" v="146" actId="1076"/>
-          <ac:spMkLst>
-            <pc:docMk/>
-            <pc:sldMk cId="1609848839" sldId="256"/>
-            <ac:spMk id="52" creationId="{C9375A12-4150-4C9A-A5FF-3226CB9B6B71}"/>
-          </ac:spMkLst>
-        </pc:spChg>
-        <pc:graphicFrameChg chg="mod modGraphic">
-          <ac:chgData name="Frederick, Samuel" userId="090dec4f-7d84-4616-bef6-b2226d1b24c4" providerId="ADAL" clId="{360A67A5-37B6-4E00-A191-96F89693057C}" dt="2021-06-25T17:37:23.694" v="30" actId="20577"/>
-          <ac:graphicFrameMkLst>
-            <pc:docMk/>
-            <pc:sldMk cId="1609848839" sldId="256"/>
-            <ac:graphicFrameMk id="18" creationId="{47941790-F508-45B8-841D-BA5D6A7CA69F}"/>
-          </ac:graphicFrameMkLst>
-        </pc:graphicFrameChg>
-        <pc:graphicFrameChg chg="mod modGraphic">
-          <ac:chgData name="Frederick, Samuel" userId="090dec4f-7d84-4616-bef6-b2226d1b24c4" providerId="ADAL" clId="{360A67A5-37B6-4E00-A191-96F89693057C}" dt="2021-06-25T17:37:01.740" v="20"/>
-          <ac:graphicFrameMkLst>
-            <pc:docMk/>
-            <pc:sldMk cId="1609848839" sldId="256"/>
-            <ac:graphicFrameMk id="30" creationId="{21A58A00-867E-4586-9E12-B610E1FDCE28}"/>
-          </ac:graphicFrameMkLst>
-        </pc:graphicFrameChg>
-        <pc:graphicFrameChg chg="add mod modGraphic">
-          <ac:chgData name="Frederick, Samuel" userId="090dec4f-7d84-4616-bef6-b2226d1b24c4" providerId="ADAL" clId="{360A67A5-37B6-4E00-A191-96F89693057C}" dt="2021-06-25T17:45:13.595" v="141" actId="20577"/>
-          <ac:graphicFrameMkLst>
-            <pc:docMk/>
-            <pc:sldMk cId="1609848839" sldId="256"/>
-            <ac:graphicFrameMk id="32" creationId="{B8FDD0E3-4EC8-4FB4-AAC5-E9C047C9329F}"/>
-          </ac:graphicFrameMkLst>
-        </pc:graphicFrameChg>
-        <pc:graphicFrameChg chg="add mod">
-          <ac:chgData name="Frederick, Samuel" userId="090dec4f-7d84-4616-bef6-b2226d1b24c4" providerId="ADAL" clId="{360A67A5-37B6-4E00-A191-96F89693057C}" dt="2021-06-25T17:43:43.265" v="111"/>
-          <ac:graphicFrameMkLst>
-            <pc:docMk/>
-            <pc:sldMk cId="1609848839" sldId="256"/>
-            <ac:graphicFrameMk id="33" creationId="{FF6CC21A-1E4F-4F2B-8F5A-10BA08714989}"/>
-          </ac:graphicFrameMkLst>
-        </pc:graphicFrameChg>
-        <pc:graphicFrameChg chg="del mod">
-          <ac:chgData name="Frederick, Samuel" userId="090dec4f-7d84-4616-bef6-b2226d1b24c4" providerId="ADAL" clId="{360A67A5-37B6-4E00-A191-96F89693057C}" dt="2021-06-25T17:43:34.700" v="109" actId="478"/>
-          <ac:graphicFrameMkLst>
-            <pc:docMk/>
-            <pc:sldMk cId="1609848839" sldId="256"/>
-            <ac:graphicFrameMk id="45" creationId="{CF285BA3-2F77-44D6-A90D-FA09A3ABA0E1}"/>
-          </ac:graphicFrameMkLst>
-        </pc:graphicFrameChg>
-        <pc:graphicFrameChg chg="del">
-          <ac:chgData name="Frederick, Samuel" userId="090dec4f-7d84-4616-bef6-b2226d1b24c4" providerId="ADAL" clId="{360A67A5-37B6-4E00-A191-96F89693057C}" dt="2021-06-25T17:43:36.491" v="110" actId="478"/>
-          <ac:graphicFrameMkLst>
-            <pc:docMk/>
-            <pc:sldMk cId="1609848839" sldId="256"/>
-            <ac:graphicFrameMk id="48" creationId="{AEF6C188-35F2-47DE-9D82-969D34B1EECF}"/>
-          </ac:graphicFrameMkLst>
-        </pc:graphicFrameChg>
-        <pc:graphicFrameChg chg="mod">
-          <ac:chgData name="Frederick, Samuel" userId="090dec4f-7d84-4616-bef6-b2226d1b24c4" providerId="ADAL" clId="{360A67A5-37B6-4E00-A191-96F89693057C}" dt="2021-06-25T17:36:28.360" v="10"/>
-          <ac:graphicFrameMkLst>
-            <pc:docMk/>
-            <pc:sldMk cId="1609848839" sldId="256"/>
-            <ac:graphicFrameMk id="51" creationId="{38C03BB1-CCE2-4806-8CE1-DD9943BC99C5}"/>
-          </ac:graphicFrameMkLst>
-        </pc:graphicFrameChg>
-        <pc:graphicFrameChg chg="mod modGraphic">
-          <ac:chgData name="Frederick, Samuel" userId="090dec4f-7d84-4616-bef6-b2226d1b24c4" providerId="ADAL" clId="{360A67A5-37B6-4E00-A191-96F89693057C}" dt="2021-06-25T17:43:31.759" v="108" actId="20577"/>
-          <ac:graphicFrameMkLst>
-            <pc:docMk/>
-            <pc:sldMk cId="1609848839" sldId="256"/>
-            <ac:graphicFrameMk id="56" creationId="{957E01A2-5E7D-419F-9E4A-7EC900B83EF7}"/>
-          </ac:graphicFrameMkLst>
-        </pc:graphicFrameChg>
-        <pc:cxnChg chg="add del mod">
-          <ac:chgData name="Frederick, Samuel" userId="090dec4f-7d84-4616-bef6-b2226d1b24c4" providerId="ADAL" clId="{360A67A5-37B6-4E00-A191-96F89693057C}" dt="2021-06-25T17:48:28.005" v="167" actId="478"/>
-          <ac:cxnSpMkLst>
-            <pc:docMk/>
-            <pc:sldMk cId="1609848839" sldId="256"/>
-            <ac:cxnSpMk id="9" creationId="{26AAFB8C-FD3F-4C54-BEF5-72647006D2F7}"/>
-          </ac:cxnSpMkLst>
-        </pc:cxnChg>
-      </pc:sldChg>
-      <pc:sldChg chg="addSp delSp modSp mod">
-        <pc:chgData name="Frederick, Samuel" userId="090dec4f-7d84-4616-bef6-b2226d1b24c4" providerId="ADAL" clId="{360A67A5-37B6-4E00-A191-96F89693057C}" dt="2021-06-25T17:35:46.375" v="8"/>
-        <pc:sldMkLst>
-          <pc:docMk/>
-          <pc:sldMk cId="677627962" sldId="260"/>
-        </pc:sldMkLst>
-        <pc:spChg chg="mod">
-          <ac:chgData name="Frederick, Samuel" userId="090dec4f-7d84-4616-bef6-b2226d1b24c4" providerId="ADAL" clId="{360A67A5-37B6-4E00-A191-96F89693057C}" dt="2021-06-25T17:35:10.147" v="5"/>
-          <ac:spMkLst>
-            <pc:docMk/>
-            <pc:sldMk cId="677627962" sldId="260"/>
-            <ac:spMk id="2" creationId="{5D2552CA-E9B4-457D-8B68-179D7461EB2D}"/>
-          </ac:spMkLst>
-        </pc:spChg>
-        <pc:spChg chg="del">
-          <ac:chgData name="Frederick, Samuel" userId="090dec4f-7d84-4616-bef6-b2226d1b24c4" providerId="ADAL" clId="{360A67A5-37B6-4E00-A191-96F89693057C}" dt="2021-06-25T17:35:10.147" v="5"/>
-          <ac:spMkLst>
-            <pc:docMk/>
-            <pc:sldMk cId="677627962" sldId="260"/>
-            <ac:spMk id="3" creationId="{4BE0F3C0-76E9-4BB6-BD59-BD00B774211E}"/>
-          </ac:spMkLst>
-        </pc:spChg>
-        <pc:spChg chg="add mod">
-          <ac:chgData name="Frederick, Samuel" userId="090dec4f-7d84-4616-bef6-b2226d1b24c4" providerId="ADAL" clId="{360A67A5-37B6-4E00-A191-96F89693057C}" dt="2021-06-25T17:35:10.147" v="5"/>
-          <ac:spMkLst>
-            <pc:docMk/>
-            <pc:sldMk cId="677627962" sldId="260"/>
-            <ac:spMk id="4" creationId="{6692EA42-EB5D-4422-9089-993AB136B2A6}"/>
-          </ac:spMkLst>
-        </pc:spChg>
-        <pc:spChg chg="mod">
-          <ac:chgData name="Frederick, Samuel" userId="090dec4f-7d84-4616-bef6-b2226d1b24c4" providerId="ADAL" clId="{360A67A5-37B6-4E00-A191-96F89693057C}" dt="2021-06-25T17:35:36.805" v="6"/>
-          <ac:spMkLst>
-            <pc:docMk/>
-            <pc:sldMk cId="677627962" sldId="260"/>
-            <ac:spMk id="5" creationId="{CA368A03-BB5B-4890-85C6-EC0F1DF40864}"/>
-          </ac:spMkLst>
-        </pc:spChg>
-        <pc:spChg chg="del">
-          <ac:chgData name="Frederick, Samuel" userId="090dec4f-7d84-4616-bef6-b2226d1b24c4" providerId="ADAL" clId="{360A67A5-37B6-4E00-A191-96F89693057C}" dt="2021-06-25T17:35:10.147" v="5"/>
-          <ac:spMkLst>
-            <pc:docMk/>
-            <pc:sldMk cId="677627962" sldId="260"/>
-            <ac:spMk id="6" creationId="{1FAC7418-B39F-48F7-A3F0-03D3E3D9F453}"/>
-          </ac:spMkLst>
-        </pc:spChg>
-        <pc:spChg chg="del">
-          <ac:chgData name="Frederick, Samuel" userId="090dec4f-7d84-4616-bef6-b2226d1b24c4" providerId="ADAL" clId="{360A67A5-37B6-4E00-A191-96F89693057C}" dt="2021-06-25T17:35:10.147" v="5"/>
-          <ac:spMkLst>
-            <pc:docMk/>
-            <pc:sldMk cId="677627962" sldId="260"/>
-            <ac:spMk id="7" creationId="{368CB50A-0C49-471D-870B-C34E5F12DC10}"/>
-          </ac:spMkLst>
-        </pc:spChg>
-        <pc:spChg chg="add mod">
-          <ac:chgData name="Frederick, Samuel" userId="090dec4f-7d84-4616-bef6-b2226d1b24c4" providerId="ADAL" clId="{360A67A5-37B6-4E00-A191-96F89693057C}" dt="2021-06-25T17:35:10.147" v="5"/>
-          <ac:spMkLst>
-            <pc:docMk/>
-            <pc:sldMk cId="677627962" sldId="260"/>
-            <ac:spMk id="8" creationId="{64EE5381-67C9-4DEA-ACDB-E9F8D6D7F4BE}"/>
-          </ac:spMkLst>
-        </pc:spChg>
-        <pc:spChg chg="add mod">
-          <ac:chgData name="Frederick, Samuel" userId="090dec4f-7d84-4616-bef6-b2226d1b24c4" providerId="ADAL" clId="{360A67A5-37B6-4E00-A191-96F89693057C}" dt="2021-06-25T17:35:10.147" v="5"/>
-          <ac:spMkLst>
-            <pc:docMk/>
-            <pc:sldMk cId="677627962" sldId="260"/>
-            <ac:spMk id="9" creationId="{5A97FEA4-A915-4FBD-B17A-D47AA1C1C52F}"/>
-          </ac:spMkLst>
-        </pc:spChg>
-        <pc:graphicFrameChg chg="del">
-          <ac:chgData name="Frederick, Samuel" userId="090dec4f-7d84-4616-bef6-b2226d1b24c4" providerId="ADAL" clId="{360A67A5-37B6-4E00-A191-96F89693057C}" dt="2021-06-25T17:35:46.207" v="7" actId="478"/>
-          <ac:graphicFrameMkLst>
-            <pc:docMk/>
-            <pc:sldMk cId="677627962" sldId="260"/>
-            <ac:graphicFrameMk id="12" creationId="{D41C8C22-744A-414D-A6F3-9BDC3E39EEDF}"/>
-          </ac:graphicFrameMkLst>
-        </pc:graphicFrameChg>
-        <pc:graphicFrameChg chg="add mod">
-          <ac:chgData name="Frederick, Samuel" userId="090dec4f-7d84-4616-bef6-b2226d1b24c4" providerId="ADAL" clId="{360A67A5-37B6-4E00-A191-96F89693057C}" dt="2021-06-25T17:35:46.375" v="8"/>
-          <ac:graphicFrameMkLst>
-            <pc:docMk/>
-            <pc:sldMk cId="677627962" sldId="260"/>
-            <ac:graphicFrameMk id="15" creationId="{FBCA8259-4FB6-42FD-AB91-6E8235005AB8}"/>
-          </ac:graphicFrameMkLst>
-        </pc:graphicFrameChg>
-      </pc:sldChg>
-      <pc:sldMasterChg chg="modSldLayout">
-        <pc:chgData name="Frederick, Samuel" userId="090dec4f-7d84-4616-bef6-b2226d1b24c4" providerId="ADAL" clId="{360A67A5-37B6-4E00-A191-96F89693057C}" dt="2021-06-25T17:34:54.934" v="3"/>
-        <pc:sldMasterMkLst>
-          <pc:docMk/>
-          <pc:sldMasterMk cId="1191321755" sldId="2147483684"/>
-        </pc:sldMasterMkLst>
-        <pc:sldLayoutChg chg="addSp delSp modSp mod">
-          <pc:chgData name="Frederick, Samuel" userId="090dec4f-7d84-4616-bef6-b2226d1b24c4" providerId="ADAL" clId="{360A67A5-37B6-4E00-A191-96F89693057C}" dt="2021-06-25T17:34:54.934" v="3"/>
-          <pc:sldLayoutMkLst>
-            <pc:docMk/>
-            <pc:sldMasterMk cId="1191321755" sldId="2147483684"/>
-            <pc:sldLayoutMk cId="6746695" sldId="2147483685"/>
-          </pc:sldLayoutMkLst>
-          <pc:spChg chg="del">
-            <ac:chgData name="Frederick, Samuel" userId="090dec4f-7d84-4616-bef6-b2226d1b24c4" providerId="ADAL" clId="{360A67A5-37B6-4E00-A191-96F89693057C}" dt="2021-06-25T17:34:54.370" v="2" actId="478"/>
-            <ac:spMkLst>
-              <pc:docMk/>
-              <pc:sldMasterMk cId="1191321755" sldId="2147483684"/>
-              <pc:sldLayoutMk cId="6746695" sldId="2147483685"/>
-              <ac:spMk id="9" creationId="{7BC6E539-5244-48A9-9F4E-73EEB03CD7D7}"/>
-            </ac:spMkLst>
-          </pc:spChg>
-          <pc:spChg chg="add mod">
-            <ac:chgData name="Frederick, Samuel" userId="090dec4f-7d84-4616-bef6-b2226d1b24c4" providerId="ADAL" clId="{360A67A5-37B6-4E00-A191-96F89693057C}" dt="2021-06-25T17:34:54.934" v="3"/>
-            <ac:spMkLst>
-              <pc:docMk/>
-              <pc:sldMasterMk cId="1191321755" sldId="2147483684"/>
-              <pc:sldLayoutMk cId="6746695" sldId="2147483685"/>
-              <ac:spMk id="10" creationId="{EBDB2795-E29B-423B-8CC3-2858E3CB59B9}"/>
-            </ac:spMkLst>
-          </pc:spChg>
-          <pc:spChg chg="add mod">
-            <ac:chgData name="Frederick, Samuel" userId="090dec4f-7d84-4616-bef6-b2226d1b24c4" providerId="ADAL" clId="{360A67A5-37B6-4E00-A191-96F89693057C}" dt="2021-06-25T17:34:54.934" v="3"/>
-            <ac:spMkLst>
-              <pc:docMk/>
-              <pc:sldMasterMk cId="1191321755" sldId="2147483684"/>
-              <pc:sldLayoutMk cId="6746695" sldId="2147483685"/>
-              <ac:spMk id="11" creationId="{7BDC237D-E31E-45E6-81B6-ADE019B9D1D6}"/>
-            </ac:spMkLst>
-          </pc:spChg>
-        </pc:sldLayoutChg>
-        <pc:sldLayoutChg chg="addSp delSp modSp mod">
-          <pc:chgData name="Frederick, Samuel" userId="090dec4f-7d84-4616-bef6-b2226d1b24c4" providerId="ADAL" clId="{360A67A5-37B6-4E00-A191-96F89693057C}" dt="2021-06-25T17:34:49.697" v="1"/>
-          <pc:sldLayoutMkLst>
-            <pc:docMk/>
-            <pc:sldMasterMk cId="1191321755" sldId="2147483684"/>
-            <pc:sldLayoutMk cId="45040622" sldId="2147483686"/>
-          </pc:sldLayoutMkLst>
-          <pc:spChg chg="del">
-            <ac:chgData name="Frederick, Samuel" userId="090dec4f-7d84-4616-bef6-b2226d1b24c4" providerId="ADAL" clId="{360A67A5-37B6-4E00-A191-96F89693057C}" dt="2021-06-25T17:34:49.261" v="0" actId="478"/>
-            <ac:spMkLst>
-              <pc:docMk/>
-              <pc:sldMasterMk cId="1191321755" sldId="2147483684"/>
-              <pc:sldLayoutMk cId="45040622" sldId="2147483686"/>
-              <ac:spMk id="5" creationId="{89D820F8-FAAC-4D4B-A90B-C8060CD41F76}"/>
-            </ac:spMkLst>
-          </pc:spChg>
-          <pc:spChg chg="add mod">
-            <ac:chgData name="Frederick, Samuel" userId="090dec4f-7d84-4616-bef6-b2226d1b24c4" providerId="ADAL" clId="{360A67A5-37B6-4E00-A191-96F89693057C}" dt="2021-06-25T17:34:49.697" v="1"/>
-            <ac:spMkLst>
-              <pc:docMk/>
-              <pc:sldMasterMk cId="1191321755" sldId="2147483684"/>
-              <pc:sldLayoutMk cId="45040622" sldId="2147483686"/>
-              <ac:spMk id="10" creationId="{088473F9-9820-45EC-867C-E1BAE0A43123}"/>
-            </ac:spMkLst>
-          </pc:spChg>
-          <pc:spChg chg="add mod">
-            <ac:chgData name="Frederick, Samuel" userId="090dec4f-7d84-4616-bef6-b2226d1b24c4" providerId="ADAL" clId="{360A67A5-37B6-4E00-A191-96F89693057C}" dt="2021-06-25T17:34:49.697" v="1"/>
-            <ac:spMkLst>
-              <pc:docMk/>
-              <pc:sldMasterMk cId="1191321755" sldId="2147483684"/>
-              <pc:sldLayoutMk cId="45040622" sldId="2147483686"/>
-              <ac:spMk id="11" creationId="{DFF07735-5A9D-461E-B236-B2EA294841B6}"/>
-            </ac:spMkLst>
-          </pc:spChg>
-        </pc:sldLayoutChg>
-      </pc:sldMasterChg>
-    </pc:docChg>
-  </pc:docChgLst>
   <pc:docChgLst>
     <pc:chgData name="Frederick, Samuel" userId="090dec4f-7d84-4616-bef6-b2226d1b24c4" providerId="ADAL" clId="{6302083C-E1B3-44C3-B094-27D1E811BBB1}"/>
     <pc:docChg chg="undo custSel addSld delSld modSld modMainMaster">
@@ -1670,6 +1338,338 @@
       </pc:sldMasterChg>
     </pc:docChg>
   </pc:docChgLst>
+  <pc:docChgLst>
+    <pc:chgData name="Frederick, Samuel" userId="090dec4f-7d84-4616-bef6-b2226d1b24c4" providerId="ADAL" clId="{360A67A5-37B6-4E00-A191-96F89693057C}"/>
+    <pc:docChg chg="undo redo custSel modSld modMainMaster">
+      <pc:chgData name="Frederick, Samuel" userId="090dec4f-7d84-4616-bef6-b2226d1b24c4" providerId="ADAL" clId="{360A67A5-37B6-4E00-A191-96F89693057C}" dt="2021-06-25T17:48:28.005" v="167" actId="478"/>
+      <pc:docMkLst>
+        <pc:docMk/>
+      </pc:docMkLst>
+      <pc:sldChg chg="addSp delSp modSp mod">
+        <pc:chgData name="Frederick, Samuel" userId="090dec4f-7d84-4616-bef6-b2226d1b24c4" providerId="ADAL" clId="{360A67A5-37B6-4E00-A191-96F89693057C}" dt="2021-06-25T17:48:28.005" v="167" actId="478"/>
+        <pc:sldMkLst>
+          <pc:docMk/>
+          <pc:sldMk cId="1609848839" sldId="256"/>
+        </pc:sldMkLst>
+        <pc:spChg chg="del">
+          <ac:chgData name="Frederick, Samuel" userId="090dec4f-7d84-4616-bef6-b2226d1b24c4" providerId="ADAL" clId="{360A67A5-37B6-4E00-A191-96F89693057C}" dt="2021-06-25T17:35:06.925" v="4"/>
+          <ac:spMkLst>
+            <pc:docMk/>
+            <pc:sldMk cId="1609848839" sldId="256"/>
+            <ac:spMk id="2" creationId="{D3BBE3C6-F1E4-4D42-8855-1B38098D718D}"/>
+          </ac:spMkLst>
+        </pc:spChg>
+        <pc:spChg chg="add mod">
+          <ac:chgData name="Frederick, Samuel" userId="090dec4f-7d84-4616-bef6-b2226d1b24c4" providerId="ADAL" clId="{360A67A5-37B6-4E00-A191-96F89693057C}" dt="2021-06-25T17:35:06.925" v="4"/>
+          <ac:spMkLst>
+            <pc:docMk/>
+            <pc:sldMk cId="1609848839" sldId="256"/>
+            <ac:spMk id="3" creationId="{E496A7F8-43F8-4BAA-ACE7-4F2FD405C445}"/>
+          </ac:spMkLst>
+        </pc:spChg>
+        <pc:spChg chg="del">
+          <ac:chgData name="Frederick, Samuel" userId="090dec4f-7d84-4616-bef6-b2226d1b24c4" providerId="ADAL" clId="{360A67A5-37B6-4E00-A191-96F89693057C}" dt="2021-06-25T17:35:06.925" v="4"/>
+          <ac:spMkLst>
+            <pc:docMk/>
+            <pc:sldMk cId="1609848839" sldId="256"/>
+            <ac:spMk id="4" creationId="{C1F6EC70-09A5-49CF-8C1A-8D0EB117AC03}"/>
+          </ac:spMkLst>
+        </pc:spChg>
+        <pc:spChg chg="del">
+          <ac:chgData name="Frederick, Samuel" userId="090dec4f-7d84-4616-bef6-b2226d1b24c4" providerId="ADAL" clId="{360A67A5-37B6-4E00-A191-96F89693057C}" dt="2021-06-25T17:35:06.925" v="4"/>
+          <ac:spMkLst>
+            <pc:docMk/>
+            <pc:sldMk cId="1609848839" sldId="256"/>
+            <ac:spMk id="5" creationId="{59B1715C-505C-471D-AC7B-8D5512F1F59D}"/>
+          </ac:spMkLst>
+        </pc:spChg>
+        <pc:spChg chg="add mod">
+          <ac:chgData name="Frederick, Samuel" userId="090dec4f-7d84-4616-bef6-b2226d1b24c4" providerId="ADAL" clId="{360A67A5-37B6-4E00-A191-96F89693057C}" dt="2021-06-25T17:35:06.925" v="4"/>
+          <ac:spMkLst>
+            <pc:docMk/>
+            <pc:sldMk cId="1609848839" sldId="256"/>
+            <ac:spMk id="6" creationId="{A96546AC-36CF-4A51-A082-C4DB57591699}"/>
+          </ac:spMkLst>
+        </pc:spChg>
+        <pc:spChg chg="add mod">
+          <ac:chgData name="Frederick, Samuel" userId="090dec4f-7d84-4616-bef6-b2226d1b24c4" providerId="ADAL" clId="{360A67A5-37B6-4E00-A191-96F89693057C}" dt="2021-06-25T17:35:06.925" v="4"/>
+          <ac:spMkLst>
+            <pc:docMk/>
+            <pc:sldMk cId="1609848839" sldId="256"/>
+            <ac:spMk id="7" creationId="{1F867A50-C366-451C-B510-1358A8E03B8F}"/>
+          </ac:spMkLst>
+        </pc:spChg>
+        <pc:spChg chg="del mod">
+          <ac:chgData name="Frederick, Samuel" userId="090dec4f-7d84-4616-bef6-b2226d1b24c4" providerId="ADAL" clId="{360A67A5-37B6-4E00-A191-96F89693057C}" dt="2021-06-25T17:44:02.034" v="115" actId="478"/>
+          <ac:spMkLst>
+            <pc:docMk/>
+            <pc:sldMk cId="1609848839" sldId="256"/>
+            <ac:spMk id="24" creationId="{E049956A-403C-4054-B4D6-AB0C98529660}"/>
+          </ac:spMkLst>
+        </pc:spChg>
+        <pc:spChg chg="mod">
+          <ac:chgData name="Frederick, Samuel" userId="090dec4f-7d84-4616-bef6-b2226d1b24c4" providerId="ADAL" clId="{360A67A5-37B6-4E00-A191-96F89693057C}" dt="2021-06-25T17:45:51.105" v="143" actId="1076"/>
+          <ac:spMkLst>
+            <pc:docMk/>
+            <pc:sldMk cId="1609848839" sldId="256"/>
+            <ac:spMk id="31" creationId="{C2D3D90C-F994-4CC3-8652-BCA3D4370ADC}"/>
+          </ac:spMkLst>
+        </pc:spChg>
+        <pc:spChg chg="add mod">
+          <ac:chgData name="Frederick, Samuel" userId="090dec4f-7d84-4616-bef6-b2226d1b24c4" providerId="ADAL" clId="{360A67A5-37B6-4E00-A191-96F89693057C}" dt="2021-06-25T17:48:21.649" v="166" actId="1076"/>
+          <ac:spMkLst>
+            <pc:docMk/>
+            <pc:sldMk cId="1609848839" sldId="256"/>
+            <ac:spMk id="34" creationId="{7D655D40-6DF2-4B90-8D9E-8C2B333DA162}"/>
+          </ac:spMkLst>
+        </pc:spChg>
+        <pc:spChg chg="mod">
+          <ac:chgData name="Frederick, Samuel" userId="090dec4f-7d84-4616-bef6-b2226d1b24c4" providerId="ADAL" clId="{360A67A5-37B6-4E00-A191-96F89693057C}" dt="2021-06-25T17:46:59.305" v="146" actId="1076"/>
+          <ac:spMkLst>
+            <pc:docMk/>
+            <pc:sldMk cId="1609848839" sldId="256"/>
+            <ac:spMk id="52" creationId="{C9375A12-4150-4C9A-A5FF-3226CB9B6B71}"/>
+          </ac:spMkLst>
+        </pc:spChg>
+        <pc:graphicFrameChg chg="mod modGraphic">
+          <ac:chgData name="Frederick, Samuel" userId="090dec4f-7d84-4616-bef6-b2226d1b24c4" providerId="ADAL" clId="{360A67A5-37B6-4E00-A191-96F89693057C}" dt="2021-06-25T17:37:23.694" v="30" actId="20577"/>
+          <ac:graphicFrameMkLst>
+            <pc:docMk/>
+            <pc:sldMk cId="1609848839" sldId="256"/>
+            <ac:graphicFrameMk id="18" creationId="{47941790-F508-45B8-841D-BA5D6A7CA69F}"/>
+          </ac:graphicFrameMkLst>
+        </pc:graphicFrameChg>
+        <pc:graphicFrameChg chg="mod modGraphic">
+          <ac:chgData name="Frederick, Samuel" userId="090dec4f-7d84-4616-bef6-b2226d1b24c4" providerId="ADAL" clId="{360A67A5-37B6-4E00-A191-96F89693057C}" dt="2021-06-25T17:37:01.740" v="20"/>
+          <ac:graphicFrameMkLst>
+            <pc:docMk/>
+            <pc:sldMk cId="1609848839" sldId="256"/>
+            <ac:graphicFrameMk id="30" creationId="{21A58A00-867E-4586-9E12-B610E1FDCE28}"/>
+          </ac:graphicFrameMkLst>
+        </pc:graphicFrameChg>
+        <pc:graphicFrameChg chg="add mod modGraphic">
+          <ac:chgData name="Frederick, Samuel" userId="090dec4f-7d84-4616-bef6-b2226d1b24c4" providerId="ADAL" clId="{360A67A5-37B6-4E00-A191-96F89693057C}" dt="2021-06-25T17:45:13.595" v="141" actId="20577"/>
+          <ac:graphicFrameMkLst>
+            <pc:docMk/>
+            <pc:sldMk cId="1609848839" sldId="256"/>
+            <ac:graphicFrameMk id="32" creationId="{B8FDD0E3-4EC8-4FB4-AAC5-E9C047C9329F}"/>
+          </ac:graphicFrameMkLst>
+        </pc:graphicFrameChg>
+        <pc:graphicFrameChg chg="add mod">
+          <ac:chgData name="Frederick, Samuel" userId="090dec4f-7d84-4616-bef6-b2226d1b24c4" providerId="ADAL" clId="{360A67A5-37B6-4E00-A191-96F89693057C}" dt="2021-06-25T17:43:43.265" v="111"/>
+          <ac:graphicFrameMkLst>
+            <pc:docMk/>
+            <pc:sldMk cId="1609848839" sldId="256"/>
+            <ac:graphicFrameMk id="33" creationId="{FF6CC21A-1E4F-4F2B-8F5A-10BA08714989}"/>
+          </ac:graphicFrameMkLst>
+        </pc:graphicFrameChg>
+        <pc:graphicFrameChg chg="del mod">
+          <ac:chgData name="Frederick, Samuel" userId="090dec4f-7d84-4616-bef6-b2226d1b24c4" providerId="ADAL" clId="{360A67A5-37B6-4E00-A191-96F89693057C}" dt="2021-06-25T17:43:34.700" v="109" actId="478"/>
+          <ac:graphicFrameMkLst>
+            <pc:docMk/>
+            <pc:sldMk cId="1609848839" sldId="256"/>
+            <ac:graphicFrameMk id="45" creationId="{CF285BA3-2F77-44D6-A90D-FA09A3ABA0E1}"/>
+          </ac:graphicFrameMkLst>
+        </pc:graphicFrameChg>
+        <pc:graphicFrameChg chg="del">
+          <ac:chgData name="Frederick, Samuel" userId="090dec4f-7d84-4616-bef6-b2226d1b24c4" providerId="ADAL" clId="{360A67A5-37B6-4E00-A191-96F89693057C}" dt="2021-06-25T17:43:36.491" v="110" actId="478"/>
+          <ac:graphicFrameMkLst>
+            <pc:docMk/>
+            <pc:sldMk cId="1609848839" sldId="256"/>
+            <ac:graphicFrameMk id="48" creationId="{AEF6C188-35F2-47DE-9D82-969D34B1EECF}"/>
+          </ac:graphicFrameMkLst>
+        </pc:graphicFrameChg>
+        <pc:graphicFrameChg chg="mod">
+          <ac:chgData name="Frederick, Samuel" userId="090dec4f-7d84-4616-bef6-b2226d1b24c4" providerId="ADAL" clId="{360A67A5-37B6-4E00-A191-96F89693057C}" dt="2021-06-25T17:36:28.360" v="10"/>
+          <ac:graphicFrameMkLst>
+            <pc:docMk/>
+            <pc:sldMk cId="1609848839" sldId="256"/>
+            <ac:graphicFrameMk id="51" creationId="{38C03BB1-CCE2-4806-8CE1-DD9943BC99C5}"/>
+          </ac:graphicFrameMkLst>
+        </pc:graphicFrameChg>
+        <pc:graphicFrameChg chg="mod modGraphic">
+          <ac:chgData name="Frederick, Samuel" userId="090dec4f-7d84-4616-bef6-b2226d1b24c4" providerId="ADAL" clId="{360A67A5-37B6-4E00-A191-96F89693057C}" dt="2021-06-25T17:43:31.759" v="108" actId="20577"/>
+          <ac:graphicFrameMkLst>
+            <pc:docMk/>
+            <pc:sldMk cId="1609848839" sldId="256"/>
+            <ac:graphicFrameMk id="56" creationId="{957E01A2-5E7D-419F-9E4A-7EC900B83EF7}"/>
+          </ac:graphicFrameMkLst>
+        </pc:graphicFrameChg>
+        <pc:cxnChg chg="add del mod">
+          <ac:chgData name="Frederick, Samuel" userId="090dec4f-7d84-4616-bef6-b2226d1b24c4" providerId="ADAL" clId="{360A67A5-37B6-4E00-A191-96F89693057C}" dt="2021-06-25T17:48:28.005" v="167" actId="478"/>
+          <ac:cxnSpMkLst>
+            <pc:docMk/>
+            <pc:sldMk cId="1609848839" sldId="256"/>
+            <ac:cxnSpMk id="9" creationId="{26AAFB8C-FD3F-4C54-BEF5-72647006D2F7}"/>
+          </ac:cxnSpMkLst>
+        </pc:cxnChg>
+      </pc:sldChg>
+      <pc:sldChg chg="addSp delSp modSp mod">
+        <pc:chgData name="Frederick, Samuel" userId="090dec4f-7d84-4616-bef6-b2226d1b24c4" providerId="ADAL" clId="{360A67A5-37B6-4E00-A191-96F89693057C}" dt="2021-06-25T17:35:46.375" v="8"/>
+        <pc:sldMkLst>
+          <pc:docMk/>
+          <pc:sldMk cId="677627962" sldId="260"/>
+        </pc:sldMkLst>
+        <pc:spChg chg="mod">
+          <ac:chgData name="Frederick, Samuel" userId="090dec4f-7d84-4616-bef6-b2226d1b24c4" providerId="ADAL" clId="{360A67A5-37B6-4E00-A191-96F89693057C}" dt="2021-06-25T17:35:10.147" v="5"/>
+          <ac:spMkLst>
+            <pc:docMk/>
+            <pc:sldMk cId="677627962" sldId="260"/>
+            <ac:spMk id="2" creationId="{5D2552CA-E9B4-457D-8B68-179D7461EB2D}"/>
+          </ac:spMkLst>
+        </pc:spChg>
+        <pc:spChg chg="del">
+          <ac:chgData name="Frederick, Samuel" userId="090dec4f-7d84-4616-bef6-b2226d1b24c4" providerId="ADAL" clId="{360A67A5-37B6-4E00-A191-96F89693057C}" dt="2021-06-25T17:35:10.147" v="5"/>
+          <ac:spMkLst>
+            <pc:docMk/>
+            <pc:sldMk cId="677627962" sldId="260"/>
+            <ac:spMk id="3" creationId="{4BE0F3C0-76E9-4BB6-BD59-BD00B774211E}"/>
+          </ac:spMkLst>
+        </pc:spChg>
+        <pc:spChg chg="add mod">
+          <ac:chgData name="Frederick, Samuel" userId="090dec4f-7d84-4616-bef6-b2226d1b24c4" providerId="ADAL" clId="{360A67A5-37B6-4E00-A191-96F89693057C}" dt="2021-06-25T17:35:10.147" v="5"/>
+          <ac:spMkLst>
+            <pc:docMk/>
+            <pc:sldMk cId="677627962" sldId="260"/>
+            <ac:spMk id="4" creationId="{6692EA42-EB5D-4422-9089-993AB136B2A6}"/>
+          </ac:spMkLst>
+        </pc:spChg>
+        <pc:spChg chg="mod">
+          <ac:chgData name="Frederick, Samuel" userId="090dec4f-7d84-4616-bef6-b2226d1b24c4" providerId="ADAL" clId="{360A67A5-37B6-4E00-A191-96F89693057C}" dt="2021-06-25T17:35:36.805" v="6"/>
+          <ac:spMkLst>
+            <pc:docMk/>
+            <pc:sldMk cId="677627962" sldId="260"/>
+            <ac:spMk id="5" creationId="{CA368A03-BB5B-4890-85C6-EC0F1DF40864}"/>
+          </ac:spMkLst>
+        </pc:spChg>
+        <pc:spChg chg="del">
+          <ac:chgData name="Frederick, Samuel" userId="090dec4f-7d84-4616-bef6-b2226d1b24c4" providerId="ADAL" clId="{360A67A5-37B6-4E00-A191-96F89693057C}" dt="2021-06-25T17:35:10.147" v="5"/>
+          <ac:spMkLst>
+            <pc:docMk/>
+            <pc:sldMk cId="677627962" sldId="260"/>
+            <ac:spMk id="6" creationId="{1FAC7418-B39F-48F7-A3F0-03D3E3D9F453}"/>
+          </ac:spMkLst>
+        </pc:spChg>
+        <pc:spChg chg="del">
+          <ac:chgData name="Frederick, Samuel" userId="090dec4f-7d84-4616-bef6-b2226d1b24c4" providerId="ADAL" clId="{360A67A5-37B6-4E00-A191-96F89693057C}" dt="2021-06-25T17:35:10.147" v="5"/>
+          <ac:spMkLst>
+            <pc:docMk/>
+            <pc:sldMk cId="677627962" sldId="260"/>
+            <ac:spMk id="7" creationId="{368CB50A-0C49-471D-870B-C34E5F12DC10}"/>
+          </ac:spMkLst>
+        </pc:spChg>
+        <pc:spChg chg="add mod">
+          <ac:chgData name="Frederick, Samuel" userId="090dec4f-7d84-4616-bef6-b2226d1b24c4" providerId="ADAL" clId="{360A67A5-37B6-4E00-A191-96F89693057C}" dt="2021-06-25T17:35:10.147" v="5"/>
+          <ac:spMkLst>
+            <pc:docMk/>
+            <pc:sldMk cId="677627962" sldId="260"/>
+            <ac:spMk id="8" creationId="{64EE5381-67C9-4DEA-ACDB-E9F8D6D7F4BE}"/>
+          </ac:spMkLst>
+        </pc:spChg>
+        <pc:spChg chg="add mod">
+          <ac:chgData name="Frederick, Samuel" userId="090dec4f-7d84-4616-bef6-b2226d1b24c4" providerId="ADAL" clId="{360A67A5-37B6-4E00-A191-96F89693057C}" dt="2021-06-25T17:35:10.147" v="5"/>
+          <ac:spMkLst>
+            <pc:docMk/>
+            <pc:sldMk cId="677627962" sldId="260"/>
+            <ac:spMk id="9" creationId="{5A97FEA4-A915-4FBD-B17A-D47AA1C1C52F}"/>
+          </ac:spMkLst>
+        </pc:spChg>
+        <pc:graphicFrameChg chg="del">
+          <ac:chgData name="Frederick, Samuel" userId="090dec4f-7d84-4616-bef6-b2226d1b24c4" providerId="ADAL" clId="{360A67A5-37B6-4E00-A191-96F89693057C}" dt="2021-06-25T17:35:46.207" v="7" actId="478"/>
+          <ac:graphicFrameMkLst>
+            <pc:docMk/>
+            <pc:sldMk cId="677627962" sldId="260"/>
+            <ac:graphicFrameMk id="12" creationId="{D41C8C22-744A-414D-A6F3-9BDC3E39EEDF}"/>
+          </ac:graphicFrameMkLst>
+        </pc:graphicFrameChg>
+        <pc:graphicFrameChg chg="add mod">
+          <ac:chgData name="Frederick, Samuel" userId="090dec4f-7d84-4616-bef6-b2226d1b24c4" providerId="ADAL" clId="{360A67A5-37B6-4E00-A191-96F89693057C}" dt="2021-06-25T17:35:46.375" v="8"/>
+          <ac:graphicFrameMkLst>
+            <pc:docMk/>
+            <pc:sldMk cId="677627962" sldId="260"/>
+            <ac:graphicFrameMk id="15" creationId="{FBCA8259-4FB6-42FD-AB91-6E8235005AB8}"/>
+          </ac:graphicFrameMkLst>
+        </pc:graphicFrameChg>
+      </pc:sldChg>
+      <pc:sldMasterChg chg="modSldLayout">
+        <pc:chgData name="Frederick, Samuel" userId="090dec4f-7d84-4616-bef6-b2226d1b24c4" providerId="ADAL" clId="{360A67A5-37B6-4E00-A191-96F89693057C}" dt="2021-06-25T17:34:54.934" v="3"/>
+        <pc:sldMasterMkLst>
+          <pc:docMk/>
+          <pc:sldMasterMk cId="1191321755" sldId="2147483684"/>
+        </pc:sldMasterMkLst>
+        <pc:sldLayoutChg chg="addSp delSp modSp mod">
+          <pc:chgData name="Frederick, Samuel" userId="090dec4f-7d84-4616-bef6-b2226d1b24c4" providerId="ADAL" clId="{360A67A5-37B6-4E00-A191-96F89693057C}" dt="2021-06-25T17:34:54.934" v="3"/>
+          <pc:sldLayoutMkLst>
+            <pc:docMk/>
+            <pc:sldMasterMk cId="1191321755" sldId="2147483684"/>
+            <pc:sldLayoutMk cId="6746695" sldId="2147483685"/>
+          </pc:sldLayoutMkLst>
+          <pc:spChg chg="del">
+            <ac:chgData name="Frederick, Samuel" userId="090dec4f-7d84-4616-bef6-b2226d1b24c4" providerId="ADAL" clId="{360A67A5-37B6-4E00-A191-96F89693057C}" dt="2021-06-25T17:34:54.370" v="2" actId="478"/>
+            <ac:spMkLst>
+              <pc:docMk/>
+              <pc:sldMasterMk cId="1191321755" sldId="2147483684"/>
+              <pc:sldLayoutMk cId="6746695" sldId="2147483685"/>
+              <ac:spMk id="9" creationId="{7BC6E539-5244-48A9-9F4E-73EEB03CD7D7}"/>
+            </ac:spMkLst>
+          </pc:spChg>
+          <pc:spChg chg="add mod">
+            <ac:chgData name="Frederick, Samuel" userId="090dec4f-7d84-4616-bef6-b2226d1b24c4" providerId="ADAL" clId="{360A67A5-37B6-4E00-A191-96F89693057C}" dt="2021-06-25T17:34:54.934" v="3"/>
+            <ac:spMkLst>
+              <pc:docMk/>
+              <pc:sldMasterMk cId="1191321755" sldId="2147483684"/>
+              <pc:sldLayoutMk cId="6746695" sldId="2147483685"/>
+              <ac:spMk id="10" creationId="{EBDB2795-E29B-423B-8CC3-2858E3CB59B9}"/>
+            </ac:spMkLst>
+          </pc:spChg>
+          <pc:spChg chg="add mod">
+            <ac:chgData name="Frederick, Samuel" userId="090dec4f-7d84-4616-bef6-b2226d1b24c4" providerId="ADAL" clId="{360A67A5-37B6-4E00-A191-96F89693057C}" dt="2021-06-25T17:34:54.934" v="3"/>
+            <ac:spMkLst>
+              <pc:docMk/>
+              <pc:sldMasterMk cId="1191321755" sldId="2147483684"/>
+              <pc:sldLayoutMk cId="6746695" sldId="2147483685"/>
+              <ac:spMk id="11" creationId="{7BDC237D-E31E-45E6-81B6-ADE019B9D1D6}"/>
+            </ac:spMkLst>
+          </pc:spChg>
+        </pc:sldLayoutChg>
+        <pc:sldLayoutChg chg="addSp delSp modSp mod">
+          <pc:chgData name="Frederick, Samuel" userId="090dec4f-7d84-4616-bef6-b2226d1b24c4" providerId="ADAL" clId="{360A67A5-37B6-4E00-A191-96F89693057C}" dt="2021-06-25T17:34:49.697" v="1"/>
+          <pc:sldLayoutMkLst>
+            <pc:docMk/>
+            <pc:sldMasterMk cId="1191321755" sldId="2147483684"/>
+            <pc:sldLayoutMk cId="45040622" sldId="2147483686"/>
+          </pc:sldLayoutMkLst>
+          <pc:spChg chg="del">
+            <ac:chgData name="Frederick, Samuel" userId="090dec4f-7d84-4616-bef6-b2226d1b24c4" providerId="ADAL" clId="{360A67A5-37B6-4E00-A191-96F89693057C}" dt="2021-06-25T17:34:49.261" v="0" actId="478"/>
+            <ac:spMkLst>
+              <pc:docMk/>
+              <pc:sldMasterMk cId="1191321755" sldId="2147483684"/>
+              <pc:sldLayoutMk cId="45040622" sldId="2147483686"/>
+              <ac:spMk id="5" creationId="{89D820F8-FAAC-4D4B-A90B-C8060CD41F76}"/>
+            </ac:spMkLst>
+          </pc:spChg>
+          <pc:spChg chg="add mod">
+            <ac:chgData name="Frederick, Samuel" userId="090dec4f-7d84-4616-bef6-b2226d1b24c4" providerId="ADAL" clId="{360A67A5-37B6-4E00-A191-96F89693057C}" dt="2021-06-25T17:34:49.697" v="1"/>
+            <ac:spMkLst>
+              <pc:docMk/>
+              <pc:sldMasterMk cId="1191321755" sldId="2147483684"/>
+              <pc:sldLayoutMk cId="45040622" sldId="2147483686"/>
+              <ac:spMk id="10" creationId="{088473F9-9820-45EC-867C-E1BAE0A43123}"/>
+            </ac:spMkLst>
+          </pc:spChg>
+          <pc:spChg chg="add mod">
+            <ac:chgData name="Frederick, Samuel" userId="090dec4f-7d84-4616-bef6-b2226d1b24c4" providerId="ADAL" clId="{360A67A5-37B6-4E00-A191-96F89693057C}" dt="2021-06-25T17:34:49.697" v="1"/>
+            <ac:spMkLst>
+              <pc:docMk/>
+              <pc:sldMasterMk cId="1191321755" sldId="2147483684"/>
+              <pc:sldLayoutMk cId="45040622" sldId="2147483686"/>
+              <ac:spMk id="11" creationId="{DFF07735-5A9D-461E-B236-B2EA294841B6}"/>
+            </ac:spMkLst>
+          </pc:spChg>
+        </pc:sldLayoutChg>
+      </pc:sldMasterChg>
+    </pc:docChg>
+  </pc:docChgLst>
 </pc:chgInfo>
 </file>
 
@@ -1755,7 +1755,7 @@
           <a:p>
             <a:fld id="{3CA1DE52-DF04-4D3A-9C2F-16E440759AD9}" type="datetimeFigureOut">
               <a:rPr lang="en-US" smtClean="0"/>
-              <a:t>6/25/2021</a:t>
+              <a:t>1/12/2022</a:t>
             </a:fld>
             <a:endParaRPr lang="en-US"/>
           </a:p>
@@ -4866,7 +4866,7 @@
           <p:nvPr>
             <p:extLst>
               <p:ext uri="{D42A27DB-BD31-4B8C-83A1-F6EECF244321}">
-                <p14:modId xmlns:p14="http://schemas.microsoft.com/office/powerpoint/2010/main" val="15436171"/>
+                <p14:modId xmlns:p14="http://schemas.microsoft.com/office/powerpoint/2010/main" val="3137500743"/>
               </p:ext>
             </p:extLst>
           </p:nvPr>
@@ -5040,7 +5040,7 @@
                     <a:bodyPr/>
                     <a:lstStyle/>
                     <a:p>
-                      <a:pPr marL="0" marR="0" lvl="0" indent="0" algn="ctr" defTabSz="1554480" rtl="0" eaLnBrk="1" fontAlgn="auto" latinLnBrk="0" hangingPunct="1">
+                      <a:pPr marL="0" marR="0" lvl="0" indent="0" algn="l" defTabSz="1554480" rtl="0" eaLnBrk="1" fontAlgn="auto" latinLnBrk="0" hangingPunct="1">
                         <a:lnSpc>
                           <a:spcPct val="100000"/>
                         </a:lnSpc>
@@ -8249,13 +8249,13 @@
           <p:nvPr>
             <p:extLst>
               <p:ext uri="{D42A27DB-BD31-4B8C-83A1-F6EECF244321}">
-                <p14:modId xmlns:p14="http://schemas.microsoft.com/office/powerpoint/2010/main" val="1032831007"/>
+                <p14:modId xmlns:p14="http://schemas.microsoft.com/office/powerpoint/2010/main" val="120769567"/>
               </p:ext>
             </p:extLst>
           </p:nvPr>
         </p:nvGraphicFramePr>
         <p:xfrm>
-          <a:off x="1806546" y="18480402"/>
+          <a:off x="1600200" y="18278856"/>
           <a:ext cx="4442840" cy="1030064"/>
         </p:xfrm>
         <a:graphic>
@@ -8589,13 +8589,13 @@
           <p:nvPr>
             <p:extLst>
               <p:ext uri="{D42A27DB-BD31-4B8C-83A1-F6EECF244321}">
-                <p14:modId xmlns:p14="http://schemas.microsoft.com/office/powerpoint/2010/main" val="2900966569"/>
+                <p14:modId xmlns:p14="http://schemas.microsoft.com/office/powerpoint/2010/main" val="3992447454"/>
               </p:ext>
             </p:extLst>
           </p:nvPr>
         </p:nvGraphicFramePr>
         <p:xfrm>
-          <a:off x="7905366" y="18480402"/>
+          <a:off x="7905366" y="18278856"/>
           <a:ext cx="4292660" cy="1030064"/>
         </p:xfrm>
         <a:graphic>
@@ -12859,59 +12859,6 @@
 </file>
 
 <file path=customXml/item1.xml><?xml version="1.0" encoding="utf-8"?>
-<p:properties xmlns:p="http://schemas.microsoft.com/office/2006/metadata/properties" xmlns:xsi="http://www.w3.org/2001/XMLSchema-instance" xmlns:pc="http://schemas.microsoft.com/office/infopath/2007/PartnerControls">
-  <documentManagement>
-    <_Source xmlns="http://schemas.microsoft.com/sharepoint/v3/fields" xsi:nil="true"/>
-    <Language xmlns="http://schemas.microsoft.com/sharepoint/v3">English</Language>
-    <j747ac98061d40f0aa7bd47e1db5675d xmlns="4ffa91fb-a0ff-4ac5-b2db-65c790d184a4">
-      <Terms xmlns="http://schemas.microsoft.com/office/infopath/2007/PartnerControls"/>
-    </j747ac98061d40f0aa7bd47e1db5675d>
-    <External_x0020_Contributor xmlns="4ffa91fb-a0ff-4ac5-b2db-65c790d184a4" xsi:nil="true"/>
-    <TaxKeywordTaxHTField xmlns="4ffa91fb-a0ff-4ac5-b2db-65c790d184a4">
-      <Terms xmlns="http://schemas.microsoft.com/office/infopath/2007/PartnerControls"/>
-    </TaxKeywordTaxHTField>
-    <Record xmlns="4ffa91fb-a0ff-4ac5-b2db-65c790d184a4">Shared</Record>
-    <Rights xmlns="4ffa91fb-a0ff-4ac5-b2db-65c790d184a4" xsi:nil="true"/>
-    <Document_x0020_Creation_x0020_Date xmlns="4ffa91fb-a0ff-4ac5-b2db-65c790d184a4">2020-03-04T16:29:16+00:00</Document_x0020_Creation_x0020_Date>
-    <EPA_x0020_Office xmlns="4ffa91fb-a0ff-4ac5-b2db-65c790d184a4" xsi:nil="true"/>
-    <CategoryDescription xmlns="http://schemas.microsoft.com/sharepoint.v3" xsi:nil="true"/>
-    <Identifier xmlns="4ffa91fb-a0ff-4ac5-b2db-65c790d184a4" xsi:nil="true"/>
-    <_Coverage xmlns="http://schemas.microsoft.com/sharepoint/v3/fields" xsi:nil="true"/>
-    <Creator xmlns="4ffa91fb-a0ff-4ac5-b2db-65c790d184a4">
-      <UserInfo>
-        <DisplayName/>
-        <AccountId xsi:nil="true"/>
-        <AccountType/>
-      </UserInfo>
-    </Creator>
-    <EPA_x0020_Related_x0020_Documents xmlns="4ffa91fb-a0ff-4ac5-b2db-65c790d184a4" xsi:nil="true"/>
-    <EPA_x0020_Contributor xmlns="4ffa91fb-a0ff-4ac5-b2db-65c790d184a4">
-      <UserInfo>
-        <DisplayName/>
-        <AccountId xsi:nil="true"/>
-        <AccountType/>
-      </UserInfo>
-    </EPA_x0020_Contributor>
-    <TaxCatchAll xmlns="4ffa91fb-a0ff-4ac5-b2db-65c790d184a4"/>
-  </documentManagement>
-</p:properties>
-</file>
-
-<file path=customXml/item2.xml><?xml version="1.0" encoding="utf-8"?>
-<?mso-contentType ?>
-<FormTemplates xmlns="http://schemas.microsoft.com/sharepoint/v3/contenttype/forms">
-  <Display>DocumentLibraryForm</Display>
-  <Edit>DocumentLibraryForm</Edit>
-  <New>DocumentLibraryForm</New>
-</FormTemplates>
-</file>
-
-<file path=customXml/item3.xml><?xml version="1.0" encoding="utf-8"?>
-<?mso-contentType ?>
-<SharedContentType xmlns="Microsoft.SharePoint.Taxonomy.ContentTypeSync" SourceId="29f62856-1543-49d4-a736-4569d363f533" ContentTypeId="0x0101" PreviousValue="false"/>
-</file>
-
-<file path=customXml/item4.xml><?xml version="1.0" encoding="utf-8"?>
 <ct:contentTypeSchema xmlns:ct="http://schemas.microsoft.com/office/2006/metadata/contentType" xmlns:ma="http://schemas.microsoft.com/office/2006/metadata/properties/metaAttributes" ct:_="" ma:_="" ma:contentTypeName="Document" ma:contentTypeID="0x010100564A490502BCE94B94B40D182DF629A7" ma:contentTypeVersion="10" ma:contentTypeDescription="Create a new document." ma:contentTypeScope="" ma:versionID="edc9365ca1982d5cfb353b974c2fd121">
   <xsd:schema xmlns:xsd="http://www.w3.org/2001/XMLSchema" xmlns:xs="http://www.w3.org/2001/XMLSchema" xmlns:p="http://schemas.microsoft.com/office/2006/metadata/properties" xmlns:ns1="http://schemas.microsoft.com/sharepoint/v3" xmlns:ns2="4ffa91fb-a0ff-4ac5-b2db-65c790d184a4" xmlns:ns3="http://schemas.microsoft.com/sharepoint.v3" xmlns:ns4="http://schemas.microsoft.com/sharepoint/v3/fields" xmlns:ns5="92953017-96f5-40cd-8d9e-826506a80b1b" targetNamespace="http://schemas.microsoft.com/office/2006/metadata/properties" ma:root="true" ma:fieldsID="0e17b492b81938533bbafcb3131407c0" ns1:_="" ns2:_="" ns3:_="" ns4:_="" ns5:_="">
     <xsd:import namespace="http://schemas.microsoft.com/sharepoint/v3"/>
@@ -13309,36 +13256,60 @@
 </ct:contentTypeSchema>
 </file>
 
-<file path=customXml/itemProps1.xml><?xml version="1.0" encoding="utf-8"?>
-<ds:datastoreItem xmlns:ds="http://schemas.openxmlformats.org/officeDocument/2006/customXml" ds:itemID="{2EED311A-CCB5-4625-B52F-BB9F85A51581}">
-  <ds:schemaRefs>
-    <ds:schemaRef ds:uri="http://schemas.microsoft.com/office/2006/metadata/properties"/>
-    <ds:schemaRef ds:uri="http://schemas.microsoft.com/office/infopath/2007/PartnerControls"/>
-    <ds:schemaRef ds:uri="http://schemas.microsoft.com/sharepoint/v3/fields"/>
-    <ds:schemaRef ds:uri="http://schemas.microsoft.com/sharepoint/v3"/>
-    <ds:schemaRef ds:uri="4ffa91fb-a0ff-4ac5-b2db-65c790d184a4"/>
-    <ds:schemaRef ds:uri="http://schemas.microsoft.com/sharepoint.v3"/>
-  </ds:schemaRefs>
-</ds:datastoreItem>
+<file path=customXml/item2.xml><?xml version="1.0" encoding="utf-8"?>
+<?mso-contentType ?>
+<SharedContentType xmlns="Microsoft.SharePoint.Taxonomy.ContentTypeSync" SourceId="29f62856-1543-49d4-a736-4569d363f533" ContentTypeId="0x0101" PreviousValue="false"/>
 </file>
 
-<file path=customXml/itemProps2.xml><?xml version="1.0" encoding="utf-8"?>
-<ds:datastoreItem xmlns:ds="http://schemas.openxmlformats.org/officeDocument/2006/customXml" ds:itemID="{E3A66A80-EEBD-4235-BF6F-659447EA7FC0}">
-  <ds:schemaRefs>
-    <ds:schemaRef ds:uri="http://schemas.microsoft.com/sharepoint/v3/contenttype/forms"/>
-  </ds:schemaRefs>
-</ds:datastoreItem>
+<file path=customXml/item3.xml><?xml version="1.0" encoding="utf-8"?>
+<?mso-contentType ?>
+<FormTemplates xmlns="http://schemas.microsoft.com/sharepoint/v3/contenttype/forms">
+  <Display>DocumentLibraryForm</Display>
+  <Edit>DocumentLibraryForm</Edit>
+  <New>DocumentLibraryForm</New>
+</FormTemplates>
 </file>
 
-<file path=customXml/itemProps3.xml><?xml version="1.0" encoding="utf-8"?>
-<ds:datastoreItem xmlns:ds="http://schemas.openxmlformats.org/officeDocument/2006/customXml" ds:itemID="{9D969709-82DA-4F6F-85CB-B966EACA0A33}">
-  <ds:schemaRefs>
-    <ds:schemaRef ds:uri="Microsoft.SharePoint.Taxonomy.ContentTypeSync"/>
-  </ds:schemaRefs>
-</ds:datastoreItem>
+<file path=customXml/item4.xml><?xml version="1.0" encoding="utf-8"?>
+<p:properties xmlns:p="http://schemas.microsoft.com/office/2006/metadata/properties" xmlns:xsi="http://www.w3.org/2001/XMLSchema-instance" xmlns:pc="http://schemas.microsoft.com/office/infopath/2007/PartnerControls">
+  <documentManagement>
+    <_Source xmlns="http://schemas.microsoft.com/sharepoint/v3/fields" xsi:nil="true"/>
+    <Language xmlns="http://schemas.microsoft.com/sharepoint/v3">English</Language>
+    <j747ac98061d40f0aa7bd47e1db5675d xmlns="4ffa91fb-a0ff-4ac5-b2db-65c790d184a4">
+      <Terms xmlns="http://schemas.microsoft.com/office/infopath/2007/PartnerControls"/>
+    </j747ac98061d40f0aa7bd47e1db5675d>
+    <External_x0020_Contributor xmlns="4ffa91fb-a0ff-4ac5-b2db-65c790d184a4" xsi:nil="true"/>
+    <TaxKeywordTaxHTField xmlns="4ffa91fb-a0ff-4ac5-b2db-65c790d184a4">
+      <Terms xmlns="http://schemas.microsoft.com/office/infopath/2007/PartnerControls"/>
+    </TaxKeywordTaxHTField>
+    <Record xmlns="4ffa91fb-a0ff-4ac5-b2db-65c790d184a4">Shared</Record>
+    <Rights xmlns="4ffa91fb-a0ff-4ac5-b2db-65c790d184a4" xsi:nil="true"/>
+    <Document_x0020_Creation_x0020_Date xmlns="4ffa91fb-a0ff-4ac5-b2db-65c790d184a4">2020-03-04T16:29:16+00:00</Document_x0020_Creation_x0020_Date>
+    <EPA_x0020_Office xmlns="4ffa91fb-a0ff-4ac5-b2db-65c790d184a4" xsi:nil="true"/>
+    <CategoryDescription xmlns="http://schemas.microsoft.com/sharepoint.v3" xsi:nil="true"/>
+    <Identifier xmlns="4ffa91fb-a0ff-4ac5-b2db-65c790d184a4" xsi:nil="true"/>
+    <_Coverage xmlns="http://schemas.microsoft.com/sharepoint/v3/fields" xsi:nil="true"/>
+    <Creator xmlns="4ffa91fb-a0ff-4ac5-b2db-65c790d184a4">
+      <UserInfo>
+        <DisplayName/>
+        <AccountId xsi:nil="true"/>
+        <AccountType/>
+      </UserInfo>
+    </Creator>
+    <EPA_x0020_Related_x0020_Documents xmlns="4ffa91fb-a0ff-4ac5-b2db-65c790d184a4" xsi:nil="true"/>
+    <EPA_x0020_Contributor xmlns="4ffa91fb-a0ff-4ac5-b2db-65c790d184a4">
+      <UserInfo>
+        <DisplayName/>
+        <AccountId xsi:nil="true"/>
+        <AccountType/>
+      </UserInfo>
+    </EPA_x0020_Contributor>
+    <TaxCatchAll xmlns="4ffa91fb-a0ff-4ac5-b2db-65c790d184a4"/>
+  </documentManagement>
+</p:properties>
 </file>
 
-<file path=customXml/itemProps4.xml><?xml version="1.0" encoding="utf-8"?>
+<file path=customXml/itemProps1.xml><?xml version="1.0" encoding="utf-8"?>
 <ds:datastoreItem xmlns:ds="http://schemas.openxmlformats.org/officeDocument/2006/customXml" ds:itemID="{1DA0D606-E9FB-46FF-A65C-4208D58FBF6D}">
   <ds:schemaRefs>
     <ds:schemaRef ds:uri="http://schemas.microsoft.com/office/2006/metadata/contentType"/>
@@ -13358,4 +13329,33 @@
     <ds:schemaRef ds:uri="http://schemas.microsoft.com/internal/obd"/>
   </ds:schemaRefs>
 </ds:datastoreItem>
+</file>
+
+<file path=customXml/itemProps2.xml><?xml version="1.0" encoding="utf-8"?>
+<ds:datastoreItem xmlns:ds="http://schemas.openxmlformats.org/officeDocument/2006/customXml" ds:itemID="{9D969709-82DA-4F6F-85CB-B966EACA0A33}">
+  <ds:schemaRefs>
+    <ds:schemaRef ds:uri="Microsoft.SharePoint.Taxonomy.ContentTypeSync"/>
+  </ds:schemaRefs>
+</ds:datastoreItem>
+</file>
+
+<file path=customXml/itemProps3.xml><?xml version="1.0" encoding="utf-8"?>
+<ds:datastoreItem xmlns:ds="http://schemas.openxmlformats.org/officeDocument/2006/customXml" ds:itemID="{E3A66A80-EEBD-4235-BF6F-659447EA7FC0}">
+  <ds:schemaRefs>
+    <ds:schemaRef ds:uri="http://schemas.microsoft.com/sharepoint/v3/contenttype/forms"/>
+  </ds:schemaRefs>
+</ds:datastoreItem>
+</file>
+
+<file path=customXml/itemProps4.xml><?xml version="1.0" encoding="utf-8"?>
+<ds:datastoreItem xmlns:ds="http://schemas.openxmlformats.org/officeDocument/2006/customXml" ds:itemID="{2EED311A-CCB5-4625-B52F-BB9F85A51581}">
+  <ds:schemaRefs>
+    <ds:schemaRef ds:uri="http://schemas.microsoft.com/office/2006/metadata/properties"/>
+    <ds:schemaRef ds:uri="http://schemas.microsoft.com/office/infopath/2007/PartnerControls"/>
+    <ds:schemaRef ds:uri="http://schemas.microsoft.com/sharepoint/v3/fields"/>
+    <ds:schemaRef ds:uri="http://schemas.microsoft.com/sharepoint/v3"/>
+    <ds:schemaRef ds:uri="4ffa91fb-a0ff-4ac5-b2db-65c790d184a4"/>
+    <ds:schemaRef ds:uri="http://schemas.microsoft.com/sharepoint.v3"/>
+  </ds:schemaRefs>
+</ds:datastoreItem>
 </file>
</xml_diff>

<commit_message>
remove org_type, added contact email / phone number
removed org_type, added contact email / phone number in evaluation_objs\performance_report.py. Updated relating O3 and PM2.5 pptx templates (table row names) to match the changes in code.
</commit_message>
<xml_diff>
--- a/sensortoolkit/evaluation_objs/templates/O3/Reporting_Template_Base_O3.pptx
+++ b/sensortoolkit/evaluation_objs/templates/O3/Reporting_Template_Base_O3.pptx
@@ -141,6 +141,338 @@
 
 <file path=ppt/changesInfos/changesInfo1.xml><?xml version="1.0" encoding="utf-8"?>
 <pc:chgInfo xmlns:a="http://schemas.openxmlformats.org/drawingml/2006/main" xmlns:r="http://schemas.openxmlformats.org/officeDocument/2006/relationships" xmlns:ac="http://schemas.microsoft.com/office/drawing/2013/main/command" xmlns:pc="http://schemas.microsoft.com/office/powerpoint/2013/main/command">
+  <pc:docChgLst>
+    <pc:chgData name="Frederick, Samuel" userId="090dec4f-7d84-4616-bef6-b2226d1b24c4" providerId="ADAL" clId="{360A67A5-37B6-4E00-A191-96F89693057C}"/>
+    <pc:docChg chg="undo redo custSel modSld modMainMaster">
+      <pc:chgData name="Frederick, Samuel" userId="090dec4f-7d84-4616-bef6-b2226d1b24c4" providerId="ADAL" clId="{360A67A5-37B6-4E00-A191-96F89693057C}" dt="2021-06-25T17:48:28.005" v="167" actId="478"/>
+      <pc:docMkLst>
+        <pc:docMk/>
+      </pc:docMkLst>
+      <pc:sldChg chg="addSp delSp modSp mod">
+        <pc:chgData name="Frederick, Samuel" userId="090dec4f-7d84-4616-bef6-b2226d1b24c4" providerId="ADAL" clId="{360A67A5-37B6-4E00-A191-96F89693057C}" dt="2021-06-25T17:48:28.005" v="167" actId="478"/>
+        <pc:sldMkLst>
+          <pc:docMk/>
+          <pc:sldMk cId="1609848839" sldId="256"/>
+        </pc:sldMkLst>
+        <pc:spChg chg="del">
+          <ac:chgData name="Frederick, Samuel" userId="090dec4f-7d84-4616-bef6-b2226d1b24c4" providerId="ADAL" clId="{360A67A5-37B6-4E00-A191-96F89693057C}" dt="2021-06-25T17:35:06.925" v="4"/>
+          <ac:spMkLst>
+            <pc:docMk/>
+            <pc:sldMk cId="1609848839" sldId="256"/>
+            <ac:spMk id="2" creationId="{D3BBE3C6-F1E4-4D42-8855-1B38098D718D}"/>
+          </ac:spMkLst>
+        </pc:spChg>
+        <pc:spChg chg="add mod">
+          <ac:chgData name="Frederick, Samuel" userId="090dec4f-7d84-4616-bef6-b2226d1b24c4" providerId="ADAL" clId="{360A67A5-37B6-4E00-A191-96F89693057C}" dt="2021-06-25T17:35:06.925" v="4"/>
+          <ac:spMkLst>
+            <pc:docMk/>
+            <pc:sldMk cId="1609848839" sldId="256"/>
+            <ac:spMk id="3" creationId="{E496A7F8-43F8-4BAA-ACE7-4F2FD405C445}"/>
+          </ac:spMkLst>
+        </pc:spChg>
+        <pc:spChg chg="del">
+          <ac:chgData name="Frederick, Samuel" userId="090dec4f-7d84-4616-bef6-b2226d1b24c4" providerId="ADAL" clId="{360A67A5-37B6-4E00-A191-96F89693057C}" dt="2021-06-25T17:35:06.925" v="4"/>
+          <ac:spMkLst>
+            <pc:docMk/>
+            <pc:sldMk cId="1609848839" sldId="256"/>
+            <ac:spMk id="4" creationId="{C1F6EC70-09A5-49CF-8C1A-8D0EB117AC03}"/>
+          </ac:spMkLst>
+        </pc:spChg>
+        <pc:spChg chg="del">
+          <ac:chgData name="Frederick, Samuel" userId="090dec4f-7d84-4616-bef6-b2226d1b24c4" providerId="ADAL" clId="{360A67A5-37B6-4E00-A191-96F89693057C}" dt="2021-06-25T17:35:06.925" v="4"/>
+          <ac:spMkLst>
+            <pc:docMk/>
+            <pc:sldMk cId="1609848839" sldId="256"/>
+            <ac:spMk id="5" creationId="{59B1715C-505C-471D-AC7B-8D5512F1F59D}"/>
+          </ac:spMkLst>
+        </pc:spChg>
+        <pc:spChg chg="add mod">
+          <ac:chgData name="Frederick, Samuel" userId="090dec4f-7d84-4616-bef6-b2226d1b24c4" providerId="ADAL" clId="{360A67A5-37B6-4E00-A191-96F89693057C}" dt="2021-06-25T17:35:06.925" v="4"/>
+          <ac:spMkLst>
+            <pc:docMk/>
+            <pc:sldMk cId="1609848839" sldId="256"/>
+            <ac:spMk id="6" creationId="{A96546AC-36CF-4A51-A082-C4DB57591699}"/>
+          </ac:spMkLst>
+        </pc:spChg>
+        <pc:spChg chg="add mod">
+          <ac:chgData name="Frederick, Samuel" userId="090dec4f-7d84-4616-bef6-b2226d1b24c4" providerId="ADAL" clId="{360A67A5-37B6-4E00-A191-96F89693057C}" dt="2021-06-25T17:35:06.925" v="4"/>
+          <ac:spMkLst>
+            <pc:docMk/>
+            <pc:sldMk cId="1609848839" sldId="256"/>
+            <ac:spMk id="7" creationId="{1F867A50-C366-451C-B510-1358A8E03B8F}"/>
+          </ac:spMkLst>
+        </pc:spChg>
+        <pc:spChg chg="del mod">
+          <ac:chgData name="Frederick, Samuel" userId="090dec4f-7d84-4616-bef6-b2226d1b24c4" providerId="ADAL" clId="{360A67A5-37B6-4E00-A191-96F89693057C}" dt="2021-06-25T17:44:02.034" v="115" actId="478"/>
+          <ac:spMkLst>
+            <pc:docMk/>
+            <pc:sldMk cId="1609848839" sldId="256"/>
+            <ac:spMk id="24" creationId="{E049956A-403C-4054-B4D6-AB0C98529660}"/>
+          </ac:spMkLst>
+        </pc:spChg>
+        <pc:spChg chg="mod">
+          <ac:chgData name="Frederick, Samuel" userId="090dec4f-7d84-4616-bef6-b2226d1b24c4" providerId="ADAL" clId="{360A67A5-37B6-4E00-A191-96F89693057C}" dt="2021-06-25T17:45:51.105" v="143" actId="1076"/>
+          <ac:spMkLst>
+            <pc:docMk/>
+            <pc:sldMk cId="1609848839" sldId="256"/>
+            <ac:spMk id="31" creationId="{C2D3D90C-F994-4CC3-8652-BCA3D4370ADC}"/>
+          </ac:spMkLst>
+        </pc:spChg>
+        <pc:spChg chg="add mod">
+          <ac:chgData name="Frederick, Samuel" userId="090dec4f-7d84-4616-bef6-b2226d1b24c4" providerId="ADAL" clId="{360A67A5-37B6-4E00-A191-96F89693057C}" dt="2021-06-25T17:48:21.649" v="166" actId="1076"/>
+          <ac:spMkLst>
+            <pc:docMk/>
+            <pc:sldMk cId="1609848839" sldId="256"/>
+            <ac:spMk id="34" creationId="{7D655D40-6DF2-4B90-8D9E-8C2B333DA162}"/>
+          </ac:spMkLst>
+        </pc:spChg>
+        <pc:spChg chg="mod">
+          <ac:chgData name="Frederick, Samuel" userId="090dec4f-7d84-4616-bef6-b2226d1b24c4" providerId="ADAL" clId="{360A67A5-37B6-4E00-A191-96F89693057C}" dt="2021-06-25T17:46:59.305" v="146" actId="1076"/>
+          <ac:spMkLst>
+            <pc:docMk/>
+            <pc:sldMk cId="1609848839" sldId="256"/>
+            <ac:spMk id="52" creationId="{C9375A12-4150-4C9A-A5FF-3226CB9B6B71}"/>
+          </ac:spMkLst>
+        </pc:spChg>
+        <pc:graphicFrameChg chg="mod modGraphic">
+          <ac:chgData name="Frederick, Samuel" userId="090dec4f-7d84-4616-bef6-b2226d1b24c4" providerId="ADAL" clId="{360A67A5-37B6-4E00-A191-96F89693057C}" dt="2021-06-25T17:37:23.694" v="30" actId="20577"/>
+          <ac:graphicFrameMkLst>
+            <pc:docMk/>
+            <pc:sldMk cId="1609848839" sldId="256"/>
+            <ac:graphicFrameMk id="18" creationId="{47941790-F508-45B8-841D-BA5D6A7CA69F}"/>
+          </ac:graphicFrameMkLst>
+        </pc:graphicFrameChg>
+        <pc:graphicFrameChg chg="mod modGraphic">
+          <ac:chgData name="Frederick, Samuel" userId="090dec4f-7d84-4616-bef6-b2226d1b24c4" providerId="ADAL" clId="{360A67A5-37B6-4E00-A191-96F89693057C}" dt="2021-06-25T17:37:01.740" v="20"/>
+          <ac:graphicFrameMkLst>
+            <pc:docMk/>
+            <pc:sldMk cId="1609848839" sldId="256"/>
+            <ac:graphicFrameMk id="30" creationId="{21A58A00-867E-4586-9E12-B610E1FDCE28}"/>
+          </ac:graphicFrameMkLst>
+        </pc:graphicFrameChg>
+        <pc:graphicFrameChg chg="add mod modGraphic">
+          <ac:chgData name="Frederick, Samuel" userId="090dec4f-7d84-4616-bef6-b2226d1b24c4" providerId="ADAL" clId="{360A67A5-37B6-4E00-A191-96F89693057C}" dt="2021-06-25T17:45:13.595" v="141" actId="20577"/>
+          <ac:graphicFrameMkLst>
+            <pc:docMk/>
+            <pc:sldMk cId="1609848839" sldId="256"/>
+            <ac:graphicFrameMk id="32" creationId="{B8FDD0E3-4EC8-4FB4-AAC5-E9C047C9329F}"/>
+          </ac:graphicFrameMkLst>
+        </pc:graphicFrameChg>
+        <pc:graphicFrameChg chg="add mod">
+          <ac:chgData name="Frederick, Samuel" userId="090dec4f-7d84-4616-bef6-b2226d1b24c4" providerId="ADAL" clId="{360A67A5-37B6-4E00-A191-96F89693057C}" dt="2021-06-25T17:43:43.265" v="111"/>
+          <ac:graphicFrameMkLst>
+            <pc:docMk/>
+            <pc:sldMk cId="1609848839" sldId="256"/>
+            <ac:graphicFrameMk id="33" creationId="{FF6CC21A-1E4F-4F2B-8F5A-10BA08714989}"/>
+          </ac:graphicFrameMkLst>
+        </pc:graphicFrameChg>
+        <pc:graphicFrameChg chg="del mod">
+          <ac:chgData name="Frederick, Samuel" userId="090dec4f-7d84-4616-bef6-b2226d1b24c4" providerId="ADAL" clId="{360A67A5-37B6-4E00-A191-96F89693057C}" dt="2021-06-25T17:43:34.700" v="109" actId="478"/>
+          <ac:graphicFrameMkLst>
+            <pc:docMk/>
+            <pc:sldMk cId="1609848839" sldId="256"/>
+            <ac:graphicFrameMk id="45" creationId="{CF285BA3-2F77-44D6-A90D-FA09A3ABA0E1}"/>
+          </ac:graphicFrameMkLst>
+        </pc:graphicFrameChg>
+        <pc:graphicFrameChg chg="del">
+          <ac:chgData name="Frederick, Samuel" userId="090dec4f-7d84-4616-bef6-b2226d1b24c4" providerId="ADAL" clId="{360A67A5-37B6-4E00-A191-96F89693057C}" dt="2021-06-25T17:43:36.491" v="110" actId="478"/>
+          <ac:graphicFrameMkLst>
+            <pc:docMk/>
+            <pc:sldMk cId="1609848839" sldId="256"/>
+            <ac:graphicFrameMk id="48" creationId="{AEF6C188-35F2-47DE-9D82-969D34B1EECF}"/>
+          </ac:graphicFrameMkLst>
+        </pc:graphicFrameChg>
+        <pc:graphicFrameChg chg="mod">
+          <ac:chgData name="Frederick, Samuel" userId="090dec4f-7d84-4616-bef6-b2226d1b24c4" providerId="ADAL" clId="{360A67A5-37B6-4E00-A191-96F89693057C}" dt="2021-06-25T17:36:28.360" v="10"/>
+          <ac:graphicFrameMkLst>
+            <pc:docMk/>
+            <pc:sldMk cId="1609848839" sldId="256"/>
+            <ac:graphicFrameMk id="51" creationId="{38C03BB1-CCE2-4806-8CE1-DD9943BC99C5}"/>
+          </ac:graphicFrameMkLst>
+        </pc:graphicFrameChg>
+        <pc:graphicFrameChg chg="mod modGraphic">
+          <ac:chgData name="Frederick, Samuel" userId="090dec4f-7d84-4616-bef6-b2226d1b24c4" providerId="ADAL" clId="{360A67A5-37B6-4E00-A191-96F89693057C}" dt="2021-06-25T17:43:31.759" v="108" actId="20577"/>
+          <ac:graphicFrameMkLst>
+            <pc:docMk/>
+            <pc:sldMk cId="1609848839" sldId="256"/>
+            <ac:graphicFrameMk id="56" creationId="{957E01A2-5E7D-419F-9E4A-7EC900B83EF7}"/>
+          </ac:graphicFrameMkLst>
+        </pc:graphicFrameChg>
+        <pc:cxnChg chg="add del mod">
+          <ac:chgData name="Frederick, Samuel" userId="090dec4f-7d84-4616-bef6-b2226d1b24c4" providerId="ADAL" clId="{360A67A5-37B6-4E00-A191-96F89693057C}" dt="2021-06-25T17:48:28.005" v="167" actId="478"/>
+          <ac:cxnSpMkLst>
+            <pc:docMk/>
+            <pc:sldMk cId="1609848839" sldId="256"/>
+            <ac:cxnSpMk id="9" creationId="{26AAFB8C-FD3F-4C54-BEF5-72647006D2F7}"/>
+          </ac:cxnSpMkLst>
+        </pc:cxnChg>
+      </pc:sldChg>
+      <pc:sldChg chg="addSp delSp modSp mod">
+        <pc:chgData name="Frederick, Samuel" userId="090dec4f-7d84-4616-bef6-b2226d1b24c4" providerId="ADAL" clId="{360A67A5-37B6-4E00-A191-96F89693057C}" dt="2021-06-25T17:35:46.375" v="8"/>
+        <pc:sldMkLst>
+          <pc:docMk/>
+          <pc:sldMk cId="677627962" sldId="260"/>
+        </pc:sldMkLst>
+        <pc:spChg chg="mod">
+          <ac:chgData name="Frederick, Samuel" userId="090dec4f-7d84-4616-bef6-b2226d1b24c4" providerId="ADAL" clId="{360A67A5-37B6-4E00-A191-96F89693057C}" dt="2021-06-25T17:35:10.147" v="5"/>
+          <ac:spMkLst>
+            <pc:docMk/>
+            <pc:sldMk cId="677627962" sldId="260"/>
+            <ac:spMk id="2" creationId="{5D2552CA-E9B4-457D-8B68-179D7461EB2D}"/>
+          </ac:spMkLst>
+        </pc:spChg>
+        <pc:spChg chg="del">
+          <ac:chgData name="Frederick, Samuel" userId="090dec4f-7d84-4616-bef6-b2226d1b24c4" providerId="ADAL" clId="{360A67A5-37B6-4E00-A191-96F89693057C}" dt="2021-06-25T17:35:10.147" v="5"/>
+          <ac:spMkLst>
+            <pc:docMk/>
+            <pc:sldMk cId="677627962" sldId="260"/>
+            <ac:spMk id="3" creationId="{4BE0F3C0-76E9-4BB6-BD59-BD00B774211E}"/>
+          </ac:spMkLst>
+        </pc:spChg>
+        <pc:spChg chg="add mod">
+          <ac:chgData name="Frederick, Samuel" userId="090dec4f-7d84-4616-bef6-b2226d1b24c4" providerId="ADAL" clId="{360A67A5-37B6-4E00-A191-96F89693057C}" dt="2021-06-25T17:35:10.147" v="5"/>
+          <ac:spMkLst>
+            <pc:docMk/>
+            <pc:sldMk cId="677627962" sldId="260"/>
+            <ac:spMk id="4" creationId="{6692EA42-EB5D-4422-9089-993AB136B2A6}"/>
+          </ac:spMkLst>
+        </pc:spChg>
+        <pc:spChg chg="mod">
+          <ac:chgData name="Frederick, Samuel" userId="090dec4f-7d84-4616-bef6-b2226d1b24c4" providerId="ADAL" clId="{360A67A5-37B6-4E00-A191-96F89693057C}" dt="2021-06-25T17:35:36.805" v="6"/>
+          <ac:spMkLst>
+            <pc:docMk/>
+            <pc:sldMk cId="677627962" sldId="260"/>
+            <ac:spMk id="5" creationId="{CA368A03-BB5B-4890-85C6-EC0F1DF40864}"/>
+          </ac:spMkLst>
+        </pc:spChg>
+        <pc:spChg chg="del">
+          <ac:chgData name="Frederick, Samuel" userId="090dec4f-7d84-4616-bef6-b2226d1b24c4" providerId="ADAL" clId="{360A67A5-37B6-4E00-A191-96F89693057C}" dt="2021-06-25T17:35:10.147" v="5"/>
+          <ac:spMkLst>
+            <pc:docMk/>
+            <pc:sldMk cId="677627962" sldId="260"/>
+            <ac:spMk id="6" creationId="{1FAC7418-B39F-48F7-A3F0-03D3E3D9F453}"/>
+          </ac:spMkLst>
+        </pc:spChg>
+        <pc:spChg chg="del">
+          <ac:chgData name="Frederick, Samuel" userId="090dec4f-7d84-4616-bef6-b2226d1b24c4" providerId="ADAL" clId="{360A67A5-37B6-4E00-A191-96F89693057C}" dt="2021-06-25T17:35:10.147" v="5"/>
+          <ac:spMkLst>
+            <pc:docMk/>
+            <pc:sldMk cId="677627962" sldId="260"/>
+            <ac:spMk id="7" creationId="{368CB50A-0C49-471D-870B-C34E5F12DC10}"/>
+          </ac:spMkLst>
+        </pc:spChg>
+        <pc:spChg chg="add mod">
+          <ac:chgData name="Frederick, Samuel" userId="090dec4f-7d84-4616-bef6-b2226d1b24c4" providerId="ADAL" clId="{360A67A5-37B6-4E00-A191-96F89693057C}" dt="2021-06-25T17:35:10.147" v="5"/>
+          <ac:spMkLst>
+            <pc:docMk/>
+            <pc:sldMk cId="677627962" sldId="260"/>
+            <ac:spMk id="8" creationId="{64EE5381-67C9-4DEA-ACDB-E9F8D6D7F4BE}"/>
+          </ac:spMkLst>
+        </pc:spChg>
+        <pc:spChg chg="add mod">
+          <ac:chgData name="Frederick, Samuel" userId="090dec4f-7d84-4616-bef6-b2226d1b24c4" providerId="ADAL" clId="{360A67A5-37B6-4E00-A191-96F89693057C}" dt="2021-06-25T17:35:10.147" v="5"/>
+          <ac:spMkLst>
+            <pc:docMk/>
+            <pc:sldMk cId="677627962" sldId="260"/>
+            <ac:spMk id="9" creationId="{5A97FEA4-A915-4FBD-B17A-D47AA1C1C52F}"/>
+          </ac:spMkLst>
+        </pc:spChg>
+        <pc:graphicFrameChg chg="del">
+          <ac:chgData name="Frederick, Samuel" userId="090dec4f-7d84-4616-bef6-b2226d1b24c4" providerId="ADAL" clId="{360A67A5-37B6-4E00-A191-96F89693057C}" dt="2021-06-25T17:35:46.207" v="7" actId="478"/>
+          <ac:graphicFrameMkLst>
+            <pc:docMk/>
+            <pc:sldMk cId="677627962" sldId="260"/>
+            <ac:graphicFrameMk id="12" creationId="{D41C8C22-744A-414D-A6F3-9BDC3E39EEDF}"/>
+          </ac:graphicFrameMkLst>
+        </pc:graphicFrameChg>
+        <pc:graphicFrameChg chg="add mod">
+          <ac:chgData name="Frederick, Samuel" userId="090dec4f-7d84-4616-bef6-b2226d1b24c4" providerId="ADAL" clId="{360A67A5-37B6-4E00-A191-96F89693057C}" dt="2021-06-25T17:35:46.375" v="8"/>
+          <ac:graphicFrameMkLst>
+            <pc:docMk/>
+            <pc:sldMk cId="677627962" sldId="260"/>
+            <ac:graphicFrameMk id="15" creationId="{FBCA8259-4FB6-42FD-AB91-6E8235005AB8}"/>
+          </ac:graphicFrameMkLst>
+        </pc:graphicFrameChg>
+      </pc:sldChg>
+      <pc:sldMasterChg chg="modSldLayout">
+        <pc:chgData name="Frederick, Samuel" userId="090dec4f-7d84-4616-bef6-b2226d1b24c4" providerId="ADAL" clId="{360A67A5-37B6-4E00-A191-96F89693057C}" dt="2021-06-25T17:34:54.934" v="3"/>
+        <pc:sldMasterMkLst>
+          <pc:docMk/>
+          <pc:sldMasterMk cId="1191321755" sldId="2147483684"/>
+        </pc:sldMasterMkLst>
+        <pc:sldLayoutChg chg="addSp delSp modSp mod">
+          <pc:chgData name="Frederick, Samuel" userId="090dec4f-7d84-4616-bef6-b2226d1b24c4" providerId="ADAL" clId="{360A67A5-37B6-4E00-A191-96F89693057C}" dt="2021-06-25T17:34:54.934" v="3"/>
+          <pc:sldLayoutMkLst>
+            <pc:docMk/>
+            <pc:sldMasterMk cId="1191321755" sldId="2147483684"/>
+            <pc:sldLayoutMk cId="6746695" sldId="2147483685"/>
+          </pc:sldLayoutMkLst>
+          <pc:spChg chg="del">
+            <ac:chgData name="Frederick, Samuel" userId="090dec4f-7d84-4616-bef6-b2226d1b24c4" providerId="ADAL" clId="{360A67A5-37B6-4E00-A191-96F89693057C}" dt="2021-06-25T17:34:54.370" v="2" actId="478"/>
+            <ac:spMkLst>
+              <pc:docMk/>
+              <pc:sldMasterMk cId="1191321755" sldId="2147483684"/>
+              <pc:sldLayoutMk cId="6746695" sldId="2147483685"/>
+              <ac:spMk id="9" creationId="{7BC6E539-5244-48A9-9F4E-73EEB03CD7D7}"/>
+            </ac:spMkLst>
+          </pc:spChg>
+          <pc:spChg chg="add mod">
+            <ac:chgData name="Frederick, Samuel" userId="090dec4f-7d84-4616-bef6-b2226d1b24c4" providerId="ADAL" clId="{360A67A5-37B6-4E00-A191-96F89693057C}" dt="2021-06-25T17:34:54.934" v="3"/>
+            <ac:spMkLst>
+              <pc:docMk/>
+              <pc:sldMasterMk cId="1191321755" sldId="2147483684"/>
+              <pc:sldLayoutMk cId="6746695" sldId="2147483685"/>
+              <ac:spMk id="10" creationId="{EBDB2795-E29B-423B-8CC3-2858E3CB59B9}"/>
+            </ac:spMkLst>
+          </pc:spChg>
+          <pc:spChg chg="add mod">
+            <ac:chgData name="Frederick, Samuel" userId="090dec4f-7d84-4616-bef6-b2226d1b24c4" providerId="ADAL" clId="{360A67A5-37B6-4E00-A191-96F89693057C}" dt="2021-06-25T17:34:54.934" v="3"/>
+            <ac:spMkLst>
+              <pc:docMk/>
+              <pc:sldMasterMk cId="1191321755" sldId="2147483684"/>
+              <pc:sldLayoutMk cId="6746695" sldId="2147483685"/>
+              <ac:spMk id="11" creationId="{7BDC237D-E31E-45E6-81B6-ADE019B9D1D6}"/>
+            </ac:spMkLst>
+          </pc:spChg>
+        </pc:sldLayoutChg>
+        <pc:sldLayoutChg chg="addSp delSp modSp mod">
+          <pc:chgData name="Frederick, Samuel" userId="090dec4f-7d84-4616-bef6-b2226d1b24c4" providerId="ADAL" clId="{360A67A5-37B6-4E00-A191-96F89693057C}" dt="2021-06-25T17:34:49.697" v="1"/>
+          <pc:sldLayoutMkLst>
+            <pc:docMk/>
+            <pc:sldMasterMk cId="1191321755" sldId="2147483684"/>
+            <pc:sldLayoutMk cId="45040622" sldId="2147483686"/>
+          </pc:sldLayoutMkLst>
+          <pc:spChg chg="del">
+            <ac:chgData name="Frederick, Samuel" userId="090dec4f-7d84-4616-bef6-b2226d1b24c4" providerId="ADAL" clId="{360A67A5-37B6-4E00-A191-96F89693057C}" dt="2021-06-25T17:34:49.261" v="0" actId="478"/>
+            <ac:spMkLst>
+              <pc:docMk/>
+              <pc:sldMasterMk cId="1191321755" sldId="2147483684"/>
+              <pc:sldLayoutMk cId="45040622" sldId="2147483686"/>
+              <ac:spMk id="5" creationId="{89D820F8-FAAC-4D4B-A90B-C8060CD41F76}"/>
+            </ac:spMkLst>
+          </pc:spChg>
+          <pc:spChg chg="add mod">
+            <ac:chgData name="Frederick, Samuel" userId="090dec4f-7d84-4616-bef6-b2226d1b24c4" providerId="ADAL" clId="{360A67A5-37B6-4E00-A191-96F89693057C}" dt="2021-06-25T17:34:49.697" v="1"/>
+            <ac:spMkLst>
+              <pc:docMk/>
+              <pc:sldMasterMk cId="1191321755" sldId="2147483684"/>
+              <pc:sldLayoutMk cId="45040622" sldId="2147483686"/>
+              <ac:spMk id="10" creationId="{088473F9-9820-45EC-867C-E1BAE0A43123}"/>
+            </ac:spMkLst>
+          </pc:spChg>
+          <pc:spChg chg="add mod">
+            <ac:chgData name="Frederick, Samuel" userId="090dec4f-7d84-4616-bef6-b2226d1b24c4" providerId="ADAL" clId="{360A67A5-37B6-4E00-A191-96F89693057C}" dt="2021-06-25T17:34:49.697" v="1"/>
+            <ac:spMkLst>
+              <pc:docMk/>
+              <pc:sldMasterMk cId="1191321755" sldId="2147483684"/>
+              <pc:sldLayoutMk cId="45040622" sldId="2147483686"/>
+              <ac:spMk id="11" creationId="{DFF07735-5A9D-461E-B236-B2EA294841B6}"/>
+            </ac:spMkLst>
+          </pc:spChg>
+        </pc:sldLayoutChg>
+      </pc:sldMasterChg>
+    </pc:docChg>
+  </pc:docChgLst>
   <pc:docChgLst>
     <pc:chgData name="Frederick, Samuel" userId="090dec4f-7d84-4616-bef6-b2226d1b24c4" providerId="ADAL" clId="{6302083C-E1B3-44C3-B094-27D1E811BBB1}"/>
     <pc:docChg chg="undo custSel addSld delSld modSld modMainMaster">
@@ -1339,335 +1671,27 @@
     </pc:docChg>
   </pc:docChgLst>
   <pc:docChgLst>
-    <pc:chgData name="Frederick, Samuel" userId="090dec4f-7d84-4616-bef6-b2226d1b24c4" providerId="ADAL" clId="{360A67A5-37B6-4E00-A191-96F89693057C}"/>
-    <pc:docChg chg="undo redo custSel modSld modMainMaster">
-      <pc:chgData name="Frederick, Samuel" userId="090dec4f-7d84-4616-bef6-b2226d1b24c4" providerId="ADAL" clId="{360A67A5-37B6-4E00-A191-96F89693057C}" dt="2021-06-25T17:48:28.005" v="167" actId="478"/>
+    <pc:chgData name="Kumar, Menaka" userId="8972b6a7-3ec9-4ac8-b4ad-4e01d2fc2916" providerId="ADAL" clId="{3CBD65B1-3428-4E4B-A2E8-8CAD5009A5EF}"/>
+    <pc:docChg chg="modSld">
+      <pc:chgData name="Kumar, Menaka" userId="8972b6a7-3ec9-4ac8-b4ad-4e01d2fc2916" providerId="ADAL" clId="{3CBD65B1-3428-4E4B-A2E8-8CAD5009A5EF}" dt="2023-02-08T19:45:26.893" v="29" actId="20577"/>
       <pc:docMkLst>
         <pc:docMk/>
       </pc:docMkLst>
-      <pc:sldChg chg="addSp delSp modSp mod">
-        <pc:chgData name="Frederick, Samuel" userId="090dec4f-7d84-4616-bef6-b2226d1b24c4" providerId="ADAL" clId="{360A67A5-37B6-4E00-A191-96F89693057C}" dt="2021-06-25T17:48:28.005" v="167" actId="478"/>
+      <pc:sldChg chg="modSp mod">
+        <pc:chgData name="Kumar, Menaka" userId="8972b6a7-3ec9-4ac8-b4ad-4e01d2fc2916" providerId="ADAL" clId="{3CBD65B1-3428-4E4B-A2E8-8CAD5009A5EF}" dt="2023-02-08T19:45:26.893" v="29" actId="20577"/>
         <pc:sldMkLst>
           <pc:docMk/>
           <pc:sldMk cId="1609848839" sldId="256"/>
         </pc:sldMkLst>
-        <pc:spChg chg="del">
-          <ac:chgData name="Frederick, Samuel" userId="090dec4f-7d84-4616-bef6-b2226d1b24c4" providerId="ADAL" clId="{360A67A5-37B6-4E00-A191-96F89693057C}" dt="2021-06-25T17:35:06.925" v="4"/>
-          <ac:spMkLst>
-            <pc:docMk/>
-            <pc:sldMk cId="1609848839" sldId="256"/>
-            <ac:spMk id="2" creationId="{D3BBE3C6-F1E4-4D42-8855-1B38098D718D}"/>
-          </ac:spMkLst>
-        </pc:spChg>
-        <pc:spChg chg="add mod">
-          <ac:chgData name="Frederick, Samuel" userId="090dec4f-7d84-4616-bef6-b2226d1b24c4" providerId="ADAL" clId="{360A67A5-37B6-4E00-A191-96F89693057C}" dt="2021-06-25T17:35:06.925" v="4"/>
-          <ac:spMkLst>
-            <pc:docMk/>
-            <pc:sldMk cId="1609848839" sldId="256"/>
-            <ac:spMk id="3" creationId="{E496A7F8-43F8-4BAA-ACE7-4F2FD405C445}"/>
-          </ac:spMkLst>
-        </pc:spChg>
-        <pc:spChg chg="del">
-          <ac:chgData name="Frederick, Samuel" userId="090dec4f-7d84-4616-bef6-b2226d1b24c4" providerId="ADAL" clId="{360A67A5-37B6-4E00-A191-96F89693057C}" dt="2021-06-25T17:35:06.925" v="4"/>
-          <ac:spMkLst>
-            <pc:docMk/>
-            <pc:sldMk cId="1609848839" sldId="256"/>
-            <ac:spMk id="4" creationId="{C1F6EC70-09A5-49CF-8C1A-8D0EB117AC03}"/>
-          </ac:spMkLst>
-        </pc:spChg>
-        <pc:spChg chg="del">
-          <ac:chgData name="Frederick, Samuel" userId="090dec4f-7d84-4616-bef6-b2226d1b24c4" providerId="ADAL" clId="{360A67A5-37B6-4E00-A191-96F89693057C}" dt="2021-06-25T17:35:06.925" v="4"/>
-          <ac:spMkLst>
-            <pc:docMk/>
-            <pc:sldMk cId="1609848839" sldId="256"/>
-            <ac:spMk id="5" creationId="{59B1715C-505C-471D-AC7B-8D5512F1F59D}"/>
-          </ac:spMkLst>
-        </pc:spChg>
-        <pc:spChg chg="add mod">
-          <ac:chgData name="Frederick, Samuel" userId="090dec4f-7d84-4616-bef6-b2226d1b24c4" providerId="ADAL" clId="{360A67A5-37B6-4E00-A191-96F89693057C}" dt="2021-06-25T17:35:06.925" v="4"/>
-          <ac:spMkLst>
-            <pc:docMk/>
-            <pc:sldMk cId="1609848839" sldId="256"/>
-            <ac:spMk id="6" creationId="{A96546AC-36CF-4A51-A082-C4DB57591699}"/>
-          </ac:spMkLst>
-        </pc:spChg>
-        <pc:spChg chg="add mod">
-          <ac:chgData name="Frederick, Samuel" userId="090dec4f-7d84-4616-bef6-b2226d1b24c4" providerId="ADAL" clId="{360A67A5-37B6-4E00-A191-96F89693057C}" dt="2021-06-25T17:35:06.925" v="4"/>
-          <ac:spMkLst>
-            <pc:docMk/>
-            <pc:sldMk cId="1609848839" sldId="256"/>
-            <ac:spMk id="7" creationId="{1F867A50-C366-451C-B510-1358A8E03B8F}"/>
-          </ac:spMkLst>
-        </pc:spChg>
-        <pc:spChg chg="del mod">
-          <ac:chgData name="Frederick, Samuel" userId="090dec4f-7d84-4616-bef6-b2226d1b24c4" providerId="ADAL" clId="{360A67A5-37B6-4E00-A191-96F89693057C}" dt="2021-06-25T17:44:02.034" v="115" actId="478"/>
-          <ac:spMkLst>
-            <pc:docMk/>
-            <pc:sldMk cId="1609848839" sldId="256"/>
-            <ac:spMk id="24" creationId="{E049956A-403C-4054-B4D6-AB0C98529660}"/>
-          </ac:spMkLst>
-        </pc:spChg>
-        <pc:spChg chg="mod">
-          <ac:chgData name="Frederick, Samuel" userId="090dec4f-7d84-4616-bef6-b2226d1b24c4" providerId="ADAL" clId="{360A67A5-37B6-4E00-A191-96F89693057C}" dt="2021-06-25T17:45:51.105" v="143" actId="1076"/>
-          <ac:spMkLst>
-            <pc:docMk/>
-            <pc:sldMk cId="1609848839" sldId="256"/>
-            <ac:spMk id="31" creationId="{C2D3D90C-F994-4CC3-8652-BCA3D4370ADC}"/>
-          </ac:spMkLst>
-        </pc:spChg>
-        <pc:spChg chg="add mod">
-          <ac:chgData name="Frederick, Samuel" userId="090dec4f-7d84-4616-bef6-b2226d1b24c4" providerId="ADAL" clId="{360A67A5-37B6-4E00-A191-96F89693057C}" dt="2021-06-25T17:48:21.649" v="166" actId="1076"/>
-          <ac:spMkLst>
-            <pc:docMk/>
-            <pc:sldMk cId="1609848839" sldId="256"/>
-            <ac:spMk id="34" creationId="{7D655D40-6DF2-4B90-8D9E-8C2B333DA162}"/>
-          </ac:spMkLst>
-        </pc:spChg>
-        <pc:spChg chg="mod">
-          <ac:chgData name="Frederick, Samuel" userId="090dec4f-7d84-4616-bef6-b2226d1b24c4" providerId="ADAL" clId="{360A67A5-37B6-4E00-A191-96F89693057C}" dt="2021-06-25T17:46:59.305" v="146" actId="1076"/>
-          <ac:spMkLst>
-            <pc:docMk/>
-            <pc:sldMk cId="1609848839" sldId="256"/>
-            <ac:spMk id="52" creationId="{C9375A12-4150-4C9A-A5FF-3226CB9B6B71}"/>
-          </ac:spMkLst>
-        </pc:spChg>
-        <pc:graphicFrameChg chg="mod modGraphic">
-          <ac:chgData name="Frederick, Samuel" userId="090dec4f-7d84-4616-bef6-b2226d1b24c4" providerId="ADAL" clId="{360A67A5-37B6-4E00-A191-96F89693057C}" dt="2021-06-25T17:37:23.694" v="30" actId="20577"/>
+        <pc:graphicFrameChg chg="modGraphic">
+          <ac:chgData name="Kumar, Menaka" userId="8972b6a7-3ec9-4ac8-b4ad-4e01d2fc2916" providerId="ADAL" clId="{3CBD65B1-3428-4E4B-A2E8-8CAD5009A5EF}" dt="2023-02-08T19:45:26.893" v="29" actId="20577"/>
           <ac:graphicFrameMkLst>
             <pc:docMk/>
             <pc:sldMk cId="1609848839" sldId="256"/>
             <ac:graphicFrameMk id="18" creationId="{47941790-F508-45B8-841D-BA5D6A7CA69F}"/>
           </ac:graphicFrameMkLst>
         </pc:graphicFrameChg>
-        <pc:graphicFrameChg chg="mod modGraphic">
-          <ac:chgData name="Frederick, Samuel" userId="090dec4f-7d84-4616-bef6-b2226d1b24c4" providerId="ADAL" clId="{360A67A5-37B6-4E00-A191-96F89693057C}" dt="2021-06-25T17:37:01.740" v="20"/>
-          <ac:graphicFrameMkLst>
-            <pc:docMk/>
-            <pc:sldMk cId="1609848839" sldId="256"/>
-            <ac:graphicFrameMk id="30" creationId="{21A58A00-867E-4586-9E12-B610E1FDCE28}"/>
-          </ac:graphicFrameMkLst>
-        </pc:graphicFrameChg>
-        <pc:graphicFrameChg chg="add mod modGraphic">
-          <ac:chgData name="Frederick, Samuel" userId="090dec4f-7d84-4616-bef6-b2226d1b24c4" providerId="ADAL" clId="{360A67A5-37B6-4E00-A191-96F89693057C}" dt="2021-06-25T17:45:13.595" v="141" actId="20577"/>
-          <ac:graphicFrameMkLst>
-            <pc:docMk/>
-            <pc:sldMk cId="1609848839" sldId="256"/>
-            <ac:graphicFrameMk id="32" creationId="{B8FDD0E3-4EC8-4FB4-AAC5-E9C047C9329F}"/>
-          </ac:graphicFrameMkLst>
-        </pc:graphicFrameChg>
-        <pc:graphicFrameChg chg="add mod">
-          <ac:chgData name="Frederick, Samuel" userId="090dec4f-7d84-4616-bef6-b2226d1b24c4" providerId="ADAL" clId="{360A67A5-37B6-4E00-A191-96F89693057C}" dt="2021-06-25T17:43:43.265" v="111"/>
-          <ac:graphicFrameMkLst>
-            <pc:docMk/>
-            <pc:sldMk cId="1609848839" sldId="256"/>
-            <ac:graphicFrameMk id="33" creationId="{FF6CC21A-1E4F-4F2B-8F5A-10BA08714989}"/>
-          </ac:graphicFrameMkLst>
-        </pc:graphicFrameChg>
-        <pc:graphicFrameChg chg="del mod">
-          <ac:chgData name="Frederick, Samuel" userId="090dec4f-7d84-4616-bef6-b2226d1b24c4" providerId="ADAL" clId="{360A67A5-37B6-4E00-A191-96F89693057C}" dt="2021-06-25T17:43:34.700" v="109" actId="478"/>
-          <ac:graphicFrameMkLst>
-            <pc:docMk/>
-            <pc:sldMk cId="1609848839" sldId="256"/>
-            <ac:graphicFrameMk id="45" creationId="{CF285BA3-2F77-44D6-A90D-FA09A3ABA0E1}"/>
-          </ac:graphicFrameMkLst>
-        </pc:graphicFrameChg>
-        <pc:graphicFrameChg chg="del">
-          <ac:chgData name="Frederick, Samuel" userId="090dec4f-7d84-4616-bef6-b2226d1b24c4" providerId="ADAL" clId="{360A67A5-37B6-4E00-A191-96F89693057C}" dt="2021-06-25T17:43:36.491" v="110" actId="478"/>
-          <ac:graphicFrameMkLst>
-            <pc:docMk/>
-            <pc:sldMk cId="1609848839" sldId="256"/>
-            <ac:graphicFrameMk id="48" creationId="{AEF6C188-35F2-47DE-9D82-969D34B1EECF}"/>
-          </ac:graphicFrameMkLst>
-        </pc:graphicFrameChg>
-        <pc:graphicFrameChg chg="mod">
-          <ac:chgData name="Frederick, Samuel" userId="090dec4f-7d84-4616-bef6-b2226d1b24c4" providerId="ADAL" clId="{360A67A5-37B6-4E00-A191-96F89693057C}" dt="2021-06-25T17:36:28.360" v="10"/>
-          <ac:graphicFrameMkLst>
-            <pc:docMk/>
-            <pc:sldMk cId="1609848839" sldId="256"/>
-            <ac:graphicFrameMk id="51" creationId="{38C03BB1-CCE2-4806-8CE1-DD9943BC99C5}"/>
-          </ac:graphicFrameMkLst>
-        </pc:graphicFrameChg>
-        <pc:graphicFrameChg chg="mod modGraphic">
-          <ac:chgData name="Frederick, Samuel" userId="090dec4f-7d84-4616-bef6-b2226d1b24c4" providerId="ADAL" clId="{360A67A5-37B6-4E00-A191-96F89693057C}" dt="2021-06-25T17:43:31.759" v="108" actId="20577"/>
-          <ac:graphicFrameMkLst>
-            <pc:docMk/>
-            <pc:sldMk cId="1609848839" sldId="256"/>
-            <ac:graphicFrameMk id="56" creationId="{957E01A2-5E7D-419F-9E4A-7EC900B83EF7}"/>
-          </ac:graphicFrameMkLst>
-        </pc:graphicFrameChg>
-        <pc:cxnChg chg="add del mod">
-          <ac:chgData name="Frederick, Samuel" userId="090dec4f-7d84-4616-bef6-b2226d1b24c4" providerId="ADAL" clId="{360A67A5-37B6-4E00-A191-96F89693057C}" dt="2021-06-25T17:48:28.005" v="167" actId="478"/>
-          <ac:cxnSpMkLst>
-            <pc:docMk/>
-            <pc:sldMk cId="1609848839" sldId="256"/>
-            <ac:cxnSpMk id="9" creationId="{26AAFB8C-FD3F-4C54-BEF5-72647006D2F7}"/>
-          </ac:cxnSpMkLst>
-        </pc:cxnChg>
       </pc:sldChg>
-      <pc:sldChg chg="addSp delSp modSp mod">
-        <pc:chgData name="Frederick, Samuel" userId="090dec4f-7d84-4616-bef6-b2226d1b24c4" providerId="ADAL" clId="{360A67A5-37B6-4E00-A191-96F89693057C}" dt="2021-06-25T17:35:46.375" v="8"/>
-        <pc:sldMkLst>
-          <pc:docMk/>
-          <pc:sldMk cId="677627962" sldId="260"/>
-        </pc:sldMkLst>
-        <pc:spChg chg="mod">
-          <ac:chgData name="Frederick, Samuel" userId="090dec4f-7d84-4616-bef6-b2226d1b24c4" providerId="ADAL" clId="{360A67A5-37B6-4E00-A191-96F89693057C}" dt="2021-06-25T17:35:10.147" v="5"/>
-          <ac:spMkLst>
-            <pc:docMk/>
-            <pc:sldMk cId="677627962" sldId="260"/>
-            <ac:spMk id="2" creationId="{5D2552CA-E9B4-457D-8B68-179D7461EB2D}"/>
-          </ac:spMkLst>
-        </pc:spChg>
-        <pc:spChg chg="del">
-          <ac:chgData name="Frederick, Samuel" userId="090dec4f-7d84-4616-bef6-b2226d1b24c4" providerId="ADAL" clId="{360A67A5-37B6-4E00-A191-96F89693057C}" dt="2021-06-25T17:35:10.147" v="5"/>
-          <ac:spMkLst>
-            <pc:docMk/>
-            <pc:sldMk cId="677627962" sldId="260"/>
-            <ac:spMk id="3" creationId="{4BE0F3C0-76E9-4BB6-BD59-BD00B774211E}"/>
-          </ac:spMkLst>
-        </pc:spChg>
-        <pc:spChg chg="add mod">
-          <ac:chgData name="Frederick, Samuel" userId="090dec4f-7d84-4616-bef6-b2226d1b24c4" providerId="ADAL" clId="{360A67A5-37B6-4E00-A191-96F89693057C}" dt="2021-06-25T17:35:10.147" v="5"/>
-          <ac:spMkLst>
-            <pc:docMk/>
-            <pc:sldMk cId="677627962" sldId="260"/>
-            <ac:spMk id="4" creationId="{6692EA42-EB5D-4422-9089-993AB136B2A6}"/>
-          </ac:spMkLst>
-        </pc:spChg>
-        <pc:spChg chg="mod">
-          <ac:chgData name="Frederick, Samuel" userId="090dec4f-7d84-4616-bef6-b2226d1b24c4" providerId="ADAL" clId="{360A67A5-37B6-4E00-A191-96F89693057C}" dt="2021-06-25T17:35:36.805" v="6"/>
-          <ac:spMkLst>
-            <pc:docMk/>
-            <pc:sldMk cId="677627962" sldId="260"/>
-            <ac:spMk id="5" creationId="{CA368A03-BB5B-4890-85C6-EC0F1DF40864}"/>
-          </ac:spMkLst>
-        </pc:spChg>
-        <pc:spChg chg="del">
-          <ac:chgData name="Frederick, Samuel" userId="090dec4f-7d84-4616-bef6-b2226d1b24c4" providerId="ADAL" clId="{360A67A5-37B6-4E00-A191-96F89693057C}" dt="2021-06-25T17:35:10.147" v="5"/>
-          <ac:spMkLst>
-            <pc:docMk/>
-            <pc:sldMk cId="677627962" sldId="260"/>
-            <ac:spMk id="6" creationId="{1FAC7418-B39F-48F7-A3F0-03D3E3D9F453}"/>
-          </ac:spMkLst>
-        </pc:spChg>
-        <pc:spChg chg="del">
-          <ac:chgData name="Frederick, Samuel" userId="090dec4f-7d84-4616-bef6-b2226d1b24c4" providerId="ADAL" clId="{360A67A5-37B6-4E00-A191-96F89693057C}" dt="2021-06-25T17:35:10.147" v="5"/>
-          <ac:spMkLst>
-            <pc:docMk/>
-            <pc:sldMk cId="677627962" sldId="260"/>
-            <ac:spMk id="7" creationId="{368CB50A-0C49-471D-870B-C34E5F12DC10}"/>
-          </ac:spMkLst>
-        </pc:spChg>
-        <pc:spChg chg="add mod">
-          <ac:chgData name="Frederick, Samuel" userId="090dec4f-7d84-4616-bef6-b2226d1b24c4" providerId="ADAL" clId="{360A67A5-37B6-4E00-A191-96F89693057C}" dt="2021-06-25T17:35:10.147" v="5"/>
-          <ac:spMkLst>
-            <pc:docMk/>
-            <pc:sldMk cId="677627962" sldId="260"/>
-            <ac:spMk id="8" creationId="{64EE5381-67C9-4DEA-ACDB-E9F8D6D7F4BE}"/>
-          </ac:spMkLst>
-        </pc:spChg>
-        <pc:spChg chg="add mod">
-          <ac:chgData name="Frederick, Samuel" userId="090dec4f-7d84-4616-bef6-b2226d1b24c4" providerId="ADAL" clId="{360A67A5-37B6-4E00-A191-96F89693057C}" dt="2021-06-25T17:35:10.147" v="5"/>
-          <ac:spMkLst>
-            <pc:docMk/>
-            <pc:sldMk cId="677627962" sldId="260"/>
-            <ac:spMk id="9" creationId="{5A97FEA4-A915-4FBD-B17A-D47AA1C1C52F}"/>
-          </ac:spMkLst>
-        </pc:spChg>
-        <pc:graphicFrameChg chg="del">
-          <ac:chgData name="Frederick, Samuel" userId="090dec4f-7d84-4616-bef6-b2226d1b24c4" providerId="ADAL" clId="{360A67A5-37B6-4E00-A191-96F89693057C}" dt="2021-06-25T17:35:46.207" v="7" actId="478"/>
-          <ac:graphicFrameMkLst>
-            <pc:docMk/>
-            <pc:sldMk cId="677627962" sldId="260"/>
-            <ac:graphicFrameMk id="12" creationId="{D41C8C22-744A-414D-A6F3-9BDC3E39EEDF}"/>
-          </ac:graphicFrameMkLst>
-        </pc:graphicFrameChg>
-        <pc:graphicFrameChg chg="add mod">
-          <ac:chgData name="Frederick, Samuel" userId="090dec4f-7d84-4616-bef6-b2226d1b24c4" providerId="ADAL" clId="{360A67A5-37B6-4E00-A191-96F89693057C}" dt="2021-06-25T17:35:46.375" v="8"/>
-          <ac:graphicFrameMkLst>
-            <pc:docMk/>
-            <pc:sldMk cId="677627962" sldId="260"/>
-            <ac:graphicFrameMk id="15" creationId="{FBCA8259-4FB6-42FD-AB91-6E8235005AB8}"/>
-          </ac:graphicFrameMkLst>
-        </pc:graphicFrameChg>
-      </pc:sldChg>
-      <pc:sldMasterChg chg="modSldLayout">
-        <pc:chgData name="Frederick, Samuel" userId="090dec4f-7d84-4616-bef6-b2226d1b24c4" providerId="ADAL" clId="{360A67A5-37B6-4E00-A191-96F89693057C}" dt="2021-06-25T17:34:54.934" v="3"/>
-        <pc:sldMasterMkLst>
-          <pc:docMk/>
-          <pc:sldMasterMk cId="1191321755" sldId="2147483684"/>
-        </pc:sldMasterMkLst>
-        <pc:sldLayoutChg chg="addSp delSp modSp mod">
-          <pc:chgData name="Frederick, Samuel" userId="090dec4f-7d84-4616-bef6-b2226d1b24c4" providerId="ADAL" clId="{360A67A5-37B6-4E00-A191-96F89693057C}" dt="2021-06-25T17:34:54.934" v="3"/>
-          <pc:sldLayoutMkLst>
-            <pc:docMk/>
-            <pc:sldMasterMk cId="1191321755" sldId="2147483684"/>
-            <pc:sldLayoutMk cId="6746695" sldId="2147483685"/>
-          </pc:sldLayoutMkLst>
-          <pc:spChg chg="del">
-            <ac:chgData name="Frederick, Samuel" userId="090dec4f-7d84-4616-bef6-b2226d1b24c4" providerId="ADAL" clId="{360A67A5-37B6-4E00-A191-96F89693057C}" dt="2021-06-25T17:34:54.370" v="2" actId="478"/>
-            <ac:spMkLst>
-              <pc:docMk/>
-              <pc:sldMasterMk cId="1191321755" sldId="2147483684"/>
-              <pc:sldLayoutMk cId="6746695" sldId="2147483685"/>
-              <ac:spMk id="9" creationId="{7BC6E539-5244-48A9-9F4E-73EEB03CD7D7}"/>
-            </ac:spMkLst>
-          </pc:spChg>
-          <pc:spChg chg="add mod">
-            <ac:chgData name="Frederick, Samuel" userId="090dec4f-7d84-4616-bef6-b2226d1b24c4" providerId="ADAL" clId="{360A67A5-37B6-4E00-A191-96F89693057C}" dt="2021-06-25T17:34:54.934" v="3"/>
-            <ac:spMkLst>
-              <pc:docMk/>
-              <pc:sldMasterMk cId="1191321755" sldId="2147483684"/>
-              <pc:sldLayoutMk cId="6746695" sldId="2147483685"/>
-              <ac:spMk id="10" creationId="{EBDB2795-E29B-423B-8CC3-2858E3CB59B9}"/>
-            </ac:spMkLst>
-          </pc:spChg>
-          <pc:spChg chg="add mod">
-            <ac:chgData name="Frederick, Samuel" userId="090dec4f-7d84-4616-bef6-b2226d1b24c4" providerId="ADAL" clId="{360A67A5-37B6-4E00-A191-96F89693057C}" dt="2021-06-25T17:34:54.934" v="3"/>
-            <ac:spMkLst>
-              <pc:docMk/>
-              <pc:sldMasterMk cId="1191321755" sldId="2147483684"/>
-              <pc:sldLayoutMk cId="6746695" sldId="2147483685"/>
-              <ac:spMk id="11" creationId="{7BDC237D-E31E-45E6-81B6-ADE019B9D1D6}"/>
-            </ac:spMkLst>
-          </pc:spChg>
-        </pc:sldLayoutChg>
-        <pc:sldLayoutChg chg="addSp delSp modSp mod">
-          <pc:chgData name="Frederick, Samuel" userId="090dec4f-7d84-4616-bef6-b2226d1b24c4" providerId="ADAL" clId="{360A67A5-37B6-4E00-A191-96F89693057C}" dt="2021-06-25T17:34:49.697" v="1"/>
-          <pc:sldLayoutMkLst>
-            <pc:docMk/>
-            <pc:sldMasterMk cId="1191321755" sldId="2147483684"/>
-            <pc:sldLayoutMk cId="45040622" sldId="2147483686"/>
-          </pc:sldLayoutMkLst>
-          <pc:spChg chg="del">
-            <ac:chgData name="Frederick, Samuel" userId="090dec4f-7d84-4616-bef6-b2226d1b24c4" providerId="ADAL" clId="{360A67A5-37B6-4E00-A191-96F89693057C}" dt="2021-06-25T17:34:49.261" v="0" actId="478"/>
-            <ac:spMkLst>
-              <pc:docMk/>
-              <pc:sldMasterMk cId="1191321755" sldId="2147483684"/>
-              <pc:sldLayoutMk cId="45040622" sldId="2147483686"/>
-              <ac:spMk id="5" creationId="{89D820F8-FAAC-4D4B-A90B-C8060CD41F76}"/>
-            </ac:spMkLst>
-          </pc:spChg>
-          <pc:spChg chg="add mod">
-            <ac:chgData name="Frederick, Samuel" userId="090dec4f-7d84-4616-bef6-b2226d1b24c4" providerId="ADAL" clId="{360A67A5-37B6-4E00-A191-96F89693057C}" dt="2021-06-25T17:34:49.697" v="1"/>
-            <ac:spMkLst>
-              <pc:docMk/>
-              <pc:sldMasterMk cId="1191321755" sldId="2147483684"/>
-              <pc:sldLayoutMk cId="45040622" sldId="2147483686"/>
-              <ac:spMk id="10" creationId="{088473F9-9820-45EC-867C-E1BAE0A43123}"/>
-            </ac:spMkLst>
-          </pc:spChg>
-          <pc:spChg chg="add mod">
-            <ac:chgData name="Frederick, Samuel" userId="090dec4f-7d84-4616-bef6-b2226d1b24c4" providerId="ADAL" clId="{360A67A5-37B6-4E00-A191-96F89693057C}" dt="2021-06-25T17:34:49.697" v="1"/>
-            <ac:spMkLst>
-              <pc:docMk/>
-              <pc:sldMasterMk cId="1191321755" sldId="2147483684"/>
-              <pc:sldLayoutMk cId="45040622" sldId="2147483686"/>
-              <ac:spMk id="11" creationId="{DFF07735-5A9D-461E-B236-B2EA294841B6}"/>
-            </ac:spMkLst>
-          </pc:spChg>
-        </pc:sldLayoutChg>
-      </pc:sldMasterChg>
     </pc:docChg>
   </pc:docChgLst>
 </pc:chgInfo>
@@ -1755,7 +1779,7 @@
           <a:p>
             <a:fld id="{3CA1DE52-DF04-4D3A-9C2F-16E440759AD9}" type="datetimeFigureOut">
               <a:rPr lang="en-US" smtClean="0"/>
-              <a:t>5/12/2022</a:t>
+              <a:t>2/8/2023</a:t>
             </a:fld>
             <a:endParaRPr lang="en-US"/>
           </a:p>
@@ -3693,7 +3717,7 @@
           <p:nvPr>
             <p:extLst>
               <p:ext uri="{D42A27DB-BD31-4B8C-83A1-F6EECF244321}">
-                <p14:modId xmlns:p14="http://schemas.microsoft.com/office/powerpoint/2010/main" val="1885850566"/>
+                <p14:modId xmlns:p14="http://schemas.microsoft.com/office/powerpoint/2010/main" val="403890563"/>
               </p:ext>
             </p:extLst>
           </p:nvPr>
@@ -3882,7 +3906,15 @@
                             <a:sysClr val="windowText" lastClr="000000"/>
                           </a:solidFill>
                         </a:rPr>
-                        <a:t>(Name, Organization type, Contact website)</a:t>
+                        <a:t>(Name, Organization, Contact website / email </a:t>
+                      </a:r>
+                      <a:r>
+                        <a:rPr lang="en-US" sz="1200" b="0">
+                          <a:solidFill>
+                            <a:sysClr val="windowText" lastClr="000000"/>
+                          </a:solidFill>
+                        </a:rPr>
+                        <a:t>/ phone number)</a:t>
                       </a:r>
                       <a:endParaRPr lang="en-US" sz="1400" b="0" dirty="0">
                         <a:solidFill>
@@ -12969,8 +13001,42 @@
 </file>
 
 <file path=customXml/item1.xml><?xml version="1.0" encoding="utf-8"?>
-<?mso-contentType ?>
-<SharedContentType xmlns="Microsoft.SharePoint.Taxonomy.ContentTypeSync" SourceId="29f62856-1543-49d4-a736-4569d363f533" ContentTypeId="0x0101" PreviousValue="false"/>
+<p:properties xmlns:p="http://schemas.microsoft.com/office/2006/metadata/properties" xmlns:xsi="http://www.w3.org/2001/XMLSchema-instance" xmlns:pc="http://schemas.microsoft.com/office/infopath/2007/PartnerControls">
+  <documentManagement>
+    <_Source xmlns="http://schemas.microsoft.com/sharepoint/v3/fields" xsi:nil="true"/>
+    <Language xmlns="http://schemas.microsoft.com/sharepoint/v3">English</Language>
+    <j747ac98061d40f0aa7bd47e1db5675d xmlns="4ffa91fb-a0ff-4ac5-b2db-65c790d184a4">
+      <Terms xmlns="http://schemas.microsoft.com/office/infopath/2007/PartnerControls"/>
+    </j747ac98061d40f0aa7bd47e1db5675d>
+    <External_x0020_Contributor xmlns="4ffa91fb-a0ff-4ac5-b2db-65c790d184a4" xsi:nil="true"/>
+    <TaxKeywordTaxHTField xmlns="4ffa91fb-a0ff-4ac5-b2db-65c790d184a4">
+      <Terms xmlns="http://schemas.microsoft.com/office/infopath/2007/PartnerControls"/>
+    </TaxKeywordTaxHTField>
+    <Record xmlns="4ffa91fb-a0ff-4ac5-b2db-65c790d184a4">Shared</Record>
+    <Rights xmlns="4ffa91fb-a0ff-4ac5-b2db-65c790d184a4" xsi:nil="true"/>
+    <Document_x0020_Creation_x0020_Date xmlns="4ffa91fb-a0ff-4ac5-b2db-65c790d184a4">2020-03-04T16:29:16+00:00</Document_x0020_Creation_x0020_Date>
+    <EPA_x0020_Office xmlns="4ffa91fb-a0ff-4ac5-b2db-65c790d184a4" xsi:nil="true"/>
+    <CategoryDescription xmlns="http://schemas.microsoft.com/sharepoint.v3" xsi:nil="true"/>
+    <Identifier xmlns="4ffa91fb-a0ff-4ac5-b2db-65c790d184a4" xsi:nil="true"/>
+    <_Coverage xmlns="http://schemas.microsoft.com/sharepoint/v3/fields" xsi:nil="true"/>
+    <Creator xmlns="4ffa91fb-a0ff-4ac5-b2db-65c790d184a4">
+      <UserInfo>
+        <DisplayName/>
+        <AccountId xsi:nil="true"/>
+        <AccountType/>
+      </UserInfo>
+    </Creator>
+    <EPA_x0020_Related_x0020_Documents xmlns="4ffa91fb-a0ff-4ac5-b2db-65c790d184a4" xsi:nil="true"/>
+    <EPA_x0020_Contributor xmlns="4ffa91fb-a0ff-4ac5-b2db-65c790d184a4">
+      <UserInfo>
+        <DisplayName/>
+        <AccountId xsi:nil="true"/>
+        <AccountType/>
+      </UserInfo>
+    </EPA_x0020_Contributor>
+    <TaxCatchAll xmlns="4ffa91fb-a0ff-4ac5-b2db-65c790d184a4"/>
+  </documentManagement>
+</p:properties>
 </file>
 
 <file path=customXml/item2.xml><?xml version="1.0" encoding="utf-8"?>
@@ -13372,42 +13438,8 @@
 </file>
 
 <file path=customXml/item3.xml><?xml version="1.0" encoding="utf-8"?>
-<p:properties xmlns:p="http://schemas.microsoft.com/office/2006/metadata/properties" xmlns:xsi="http://www.w3.org/2001/XMLSchema-instance" xmlns:pc="http://schemas.microsoft.com/office/infopath/2007/PartnerControls">
-  <documentManagement>
-    <_Source xmlns="http://schemas.microsoft.com/sharepoint/v3/fields" xsi:nil="true"/>
-    <Language xmlns="http://schemas.microsoft.com/sharepoint/v3">English</Language>
-    <j747ac98061d40f0aa7bd47e1db5675d xmlns="4ffa91fb-a0ff-4ac5-b2db-65c790d184a4">
-      <Terms xmlns="http://schemas.microsoft.com/office/infopath/2007/PartnerControls"/>
-    </j747ac98061d40f0aa7bd47e1db5675d>
-    <External_x0020_Contributor xmlns="4ffa91fb-a0ff-4ac5-b2db-65c790d184a4" xsi:nil="true"/>
-    <TaxKeywordTaxHTField xmlns="4ffa91fb-a0ff-4ac5-b2db-65c790d184a4">
-      <Terms xmlns="http://schemas.microsoft.com/office/infopath/2007/PartnerControls"/>
-    </TaxKeywordTaxHTField>
-    <Record xmlns="4ffa91fb-a0ff-4ac5-b2db-65c790d184a4">Shared</Record>
-    <Rights xmlns="4ffa91fb-a0ff-4ac5-b2db-65c790d184a4" xsi:nil="true"/>
-    <Document_x0020_Creation_x0020_Date xmlns="4ffa91fb-a0ff-4ac5-b2db-65c790d184a4">2020-03-04T16:29:16+00:00</Document_x0020_Creation_x0020_Date>
-    <EPA_x0020_Office xmlns="4ffa91fb-a0ff-4ac5-b2db-65c790d184a4" xsi:nil="true"/>
-    <CategoryDescription xmlns="http://schemas.microsoft.com/sharepoint.v3" xsi:nil="true"/>
-    <Identifier xmlns="4ffa91fb-a0ff-4ac5-b2db-65c790d184a4" xsi:nil="true"/>
-    <_Coverage xmlns="http://schemas.microsoft.com/sharepoint/v3/fields" xsi:nil="true"/>
-    <Creator xmlns="4ffa91fb-a0ff-4ac5-b2db-65c790d184a4">
-      <UserInfo>
-        <DisplayName/>
-        <AccountId xsi:nil="true"/>
-        <AccountType/>
-      </UserInfo>
-    </Creator>
-    <EPA_x0020_Related_x0020_Documents xmlns="4ffa91fb-a0ff-4ac5-b2db-65c790d184a4" xsi:nil="true"/>
-    <EPA_x0020_Contributor xmlns="4ffa91fb-a0ff-4ac5-b2db-65c790d184a4">
-      <UserInfo>
-        <DisplayName/>
-        <AccountId xsi:nil="true"/>
-        <AccountType/>
-      </UserInfo>
-    </EPA_x0020_Contributor>
-    <TaxCatchAll xmlns="4ffa91fb-a0ff-4ac5-b2db-65c790d184a4"/>
-  </documentManagement>
-</p:properties>
+<?mso-contentType ?>
+<SharedContentType xmlns="Microsoft.SharePoint.Taxonomy.ContentTypeSync" SourceId="29f62856-1543-49d4-a736-4569d363f533" ContentTypeId="0x0101" PreviousValue="false"/>
 </file>
 
 <file path=customXml/item4.xml><?xml version="1.0" encoding="utf-8"?>
@@ -13420,9 +13452,14 @@
 </file>
 
 <file path=customXml/itemProps1.xml><?xml version="1.0" encoding="utf-8"?>
-<ds:datastoreItem xmlns:ds="http://schemas.openxmlformats.org/officeDocument/2006/customXml" ds:itemID="{9D969709-82DA-4F6F-85CB-B966EACA0A33}">
+<ds:datastoreItem xmlns:ds="http://schemas.openxmlformats.org/officeDocument/2006/customXml" ds:itemID="{2EED311A-CCB5-4625-B52F-BB9F85A51581}">
   <ds:schemaRefs>
-    <ds:schemaRef ds:uri="Microsoft.SharePoint.Taxonomy.ContentTypeSync"/>
+    <ds:schemaRef ds:uri="http://schemas.microsoft.com/office/2006/metadata/properties"/>
+    <ds:schemaRef ds:uri="http://schemas.microsoft.com/office/infopath/2007/PartnerControls"/>
+    <ds:schemaRef ds:uri="http://schemas.microsoft.com/sharepoint/v3/fields"/>
+    <ds:schemaRef ds:uri="http://schemas.microsoft.com/sharepoint/v3"/>
+    <ds:schemaRef ds:uri="4ffa91fb-a0ff-4ac5-b2db-65c790d184a4"/>
+    <ds:schemaRef ds:uri="http://schemas.microsoft.com/sharepoint.v3"/>
   </ds:schemaRefs>
 </ds:datastoreItem>
 </file>
@@ -13450,14 +13487,9 @@
 </file>
 
 <file path=customXml/itemProps3.xml><?xml version="1.0" encoding="utf-8"?>
-<ds:datastoreItem xmlns:ds="http://schemas.openxmlformats.org/officeDocument/2006/customXml" ds:itemID="{2EED311A-CCB5-4625-B52F-BB9F85A51581}">
+<ds:datastoreItem xmlns:ds="http://schemas.openxmlformats.org/officeDocument/2006/customXml" ds:itemID="{9D969709-82DA-4F6F-85CB-B966EACA0A33}">
   <ds:schemaRefs>
-    <ds:schemaRef ds:uri="http://schemas.microsoft.com/office/2006/metadata/properties"/>
-    <ds:schemaRef ds:uri="http://schemas.microsoft.com/office/infopath/2007/PartnerControls"/>
-    <ds:schemaRef ds:uri="http://schemas.microsoft.com/sharepoint/v3/fields"/>
-    <ds:schemaRef ds:uri="http://schemas.microsoft.com/sharepoint/v3"/>
-    <ds:schemaRef ds:uri="4ffa91fb-a0ff-4ac5-b2db-65c790d184a4"/>
-    <ds:schemaRef ds:uri="http://schemas.microsoft.com/sharepoint.v3"/>
+    <ds:schemaRef ds:uri="Microsoft.SharePoint.Taxonomy.ContentTypeSync"/>
   </ds:schemaRefs>
 </ds:datastoreItem>
 </file>

</xml_diff>